<commit_message>
Modifica Presentazione Power Point
</commit_message>
<xml_diff>
--- a/Presentazione_Progetto.pptx
+++ b/Presentazione_Progetto.pptx
@@ -159,7 +159,7 @@
 <file path=ppt/revisionInfo.xml><?xml version="1.0" encoding="utf-8"?>
 <p1510:revInfo xmlns:a="http://schemas.openxmlformats.org/drawingml/2006/main" xmlns:r="http://schemas.openxmlformats.org/officeDocument/2006/relationships" xmlns:p1510="http://schemas.microsoft.com/office/powerpoint/2015/10/main">
   <p1510:revLst>
-    <p1510:client id="{002FC19B-B750-46E5-AE6C-2EDFEC68FEF2}" v="26" dt="2023-12-02T20:24:53.552"/>
+    <p1510:client id="{002FC19B-B750-46E5-AE6C-2EDFEC68FEF2}" v="32" dt="2023-12-02T20:45:59.280"/>
   </p1510:revLst>
 </p1510:revInfo>
 </file>
@@ -169,7 +169,7 @@
   <pc:docChgLst>
     <pc:chgData name="Matteo MANGILI" userId="89c7df381375e6aa" providerId="LiveId" clId="{002FC19B-B750-46E5-AE6C-2EDFEC68FEF2}"/>
     <pc:docChg chg="undo custSel addSld delSld modSld">
-      <pc:chgData name="Matteo MANGILI" userId="89c7df381375e6aa" providerId="LiveId" clId="{002FC19B-B750-46E5-AE6C-2EDFEC68FEF2}" dt="2023-12-02T20:25:10.756" v="1260" actId="255"/>
+      <pc:chgData name="Matteo MANGILI" userId="89c7df381375e6aa" providerId="LiveId" clId="{002FC19B-B750-46E5-AE6C-2EDFEC68FEF2}" dt="2023-12-02T20:53:13.399" v="2415" actId="20577"/>
       <pc:docMkLst>
         <pc:docMk/>
       </pc:docMkLst>
@@ -308,7 +308,7 @@
         </pc:picChg>
       </pc:sldChg>
       <pc:sldChg chg="addSp delSp modSp mod setBg addAnim delAnim modAnim delDesignElem chgLayout">
-        <pc:chgData name="Matteo MANGILI" userId="89c7df381375e6aa" providerId="LiveId" clId="{002FC19B-B750-46E5-AE6C-2EDFEC68FEF2}" dt="2023-12-02T20:24:53.552" v="1257" actId="255"/>
+        <pc:chgData name="Matteo MANGILI" userId="89c7df381375e6aa" providerId="LiveId" clId="{002FC19B-B750-46E5-AE6C-2EDFEC68FEF2}" dt="2023-12-02T20:30:28.135" v="1454" actId="20577"/>
         <pc:sldMkLst>
           <pc:docMk/>
           <pc:sldMk cId="1249612630" sldId="297"/>
@@ -330,7 +330,7 @@
           </ac:spMkLst>
         </pc:spChg>
         <pc:spChg chg="mod ord">
-          <ac:chgData name="Matteo MANGILI" userId="89c7df381375e6aa" providerId="LiveId" clId="{002FC19B-B750-46E5-AE6C-2EDFEC68FEF2}" dt="2023-12-02T20:24:38.848" v="1255" actId="14100"/>
+          <ac:chgData name="Matteo MANGILI" userId="89c7df381375e6aa" providerId="LiveId" clId="{002FC19B-B750-46E5-AE6C-2EDFEC68FEF2}" dt="2023-12-02T20:30:28.135" v="1454" actId="20577"/>
           <ac:spMkLst>
             <pc:docMk/>
             <pc:sldMk cId="1249612630" sldId="297"/>
@@ -555,7 +555,7 @@
         </pc:picChg>
       </pc:sldChg>
       <pc:sldChg chg="addSp modSp mod setBg">
-        <pc:chgData name="Matteo MANGILI" userId="89c7df381375e6aa" providerId="LiveId" clId="{002FC19B-B750-46E5-AE6C-2EDFEC68FEF2}" dt="2023-12-02T20:21:38.395" v="1243" actId="255"/>
+        <pc:chgData name="Matteo MANGILI" userId="89c7df381375e6aa" providerId="LiveId" clId="{002FC19B-B750-46E5-AE6C-2EDFEC68FEF2}" dt="2023-12-02T20:36:50.225" v="1694" actId="20577"/>
         <pc:sldMkLst>
           <pc:docMk/>
           <pc:sldMk cId="3996999348" sldId="298"/>
@@ -569,7 +569,7 @@
           </ac:spMkLst>
         </pc:spChg>
         <pc:spChg chg="mod">
-          <ac:chgData name="Matteo MANGILI" userId="89c7df381375e6aa" providerId="LiveId" clId="{002FC19B-B750-46E5-AE6C-2EDFEC68FEF2}" dt="2023-12-02T20:21:28.075" v="1240" actId="14100"/>
+          <ac:chgData name="Matteo MANGILI" userId="89c7df381375e6aa" providerId="LiveId" clId="{002FC19B-B750-46E5-AE6C-2EDFEC68FEF2}" dt="2023-12-02T20:36:50.225" v="1694" actId="20577"/>
           <ac:spMkLst>
             <pc:docMk/>
             <pc:sldMk cId="3996999348" sldId="298"/>
@@ -720,8 +720,8 @@
           </ac:picMkLst>
         </pc:picChg>
       </pc:sldChg>
-      <pc:sldChg chg="addSp modSp mod setBg addAnim modAnim">
-        <pc:chgData name="Matteo MANGILI" userId="89c7df381375e6aa" providerId="LiveId" clId="{002FC19B-B750-46E5-AE6C-2EDFEC68FEF2}" dt="2023-12-02T20:15:12.489" v="1204" actId="255"/>
+      <pc:sldChg chg="addSp delSp modSp mod setBg addAnim modAnim">
+        <pc:chgData name="Matteo MANGILI" userId="89c7df381375e6aa" providerId="LiveId" clId="{002FC19B-B750-46E5-AE6C-2EDFEC68FEF2}" dt="2023-12-02T20:46:01.316" v="2176" actId="1076"/>
         <pc:sldMkLst>
           <pc:docMk/>
           <pc:sldMk cId="141201089" sldId="302"/>
@@ -734,8 +734,8 @@
             <ac:spMk id="2" creationId="{75031FE9-9059-4FE8-B4AC-9771F23A1B89}"/>
           </ac:spMkLst>
         </pc:spChg>
-        <pc:spChg chg="mod">
-          <ac:chgData name="Matteo MANGILI" userId="89c7df381375e6aa" providerId="LiveId" clId="{002FC19B-B750-46E5-AE6C-2EDFEC68FEF2}" dt="2023-12-02T20:15:04.473" v="1203" actId="14100"/>
+        <pc:spChg chg="del mod">
+          <ac:chgData name="Matteo MANGILI" userId="89c7df381375e6aa" providerId="LiveId" clId="{002FC19B-B750-46E5-AE6C-2EDFEC68FEF2}" dt="2023-12-02T20:45:59.280" v="2175"/>
           <ac:spMkLst>
             <pc:docMk/>
             <pc:sldMk cId="141201089" sldId="302"/>
@@ -766,6 +766,14 @@
             <ac:spMk id="89" creationId="{DB17E863-922E-4C26-BD64-E8FD41D28661}"/>
           </ac:spMkLst>
         </pc:spChg>
+        <pc:picChg chg="add mod">
+          <ac:chgData name="Matteo MANGILI" userId="89c7df381375e6aa" providerId="LiveId" clId="{002FC19B-B750-46E5-AE6C-2EDFEC68FEF2}" dt="2023-12-02T20:46:01.316" v="2176" actId="1076"/>
+          <ac:picMkLst>
+            <pc:docMk/>
+            <pc:sldMk cId="141201089" sldId="302"/>
+            <ac:picMk id="3" creationId="{DF52D774-0AF5-3D21-AF89-908B316763E3}"/>
+          </ac:picMkLst>
+        </pc:picChg>
       </pc:sldChg>
       <pc:sldChg chg="addSp modSp mod setBg">
         <pc:chgData name="Matteo MANGILI" userId="89c7df381375e6aa" providerId="LiveId" clId="{002FC19B-B750-46E5-AE6C-2EDFEC68FEF2}" dt="2023-12-02T20:15:57.660" v="1210" actId="255"/>
@@ -815,7 +823,7 @@
         </pc:spChg>
       </pc:sldChg>
       <pc:sldChg chg="addSp modSp mod setBg">
-        <pc:chgData name="Matteo MANGILI" userId="89c7df381375e6aa" providerId="LiveId" clId="{002FC19B-B750-46E5-AE6C-2EDFEC68FEF2}" dt="2023-12-02T20:15:21.902" v="1206" actId="255"/>
+        <pc:chgData name="Matteo MANGILI" userId="89c7df381375e6aa" providerId="LiveId" clId="{002FC19B-B750-46E5-AE6C-2EDFEC68FEF2}" dt="2023-12-02T20:53:13.399" v="2415" actId="20577"/>
         <pc:sldMkLst>
           <pc:docMk/>
           <pc:sldMk cId="2728347993" sldId="304"/>
@@ -829,7 +837,7 @@
           </ac:spMkLst>
         </pc:spChg>
         <pc:spChg chg="mod">
-          <ac:chgData name="Matteo MANGILI" userId="89c7df381375e6aa" providerId="LiveId" clId="{002FC19B-B750-46E5-AE6C-2EDFEC68FEF2}" dt="2023-12-02T20:15:17.589" v="1205" actId="14100"/>
+          <ac:chgData name="Matteo MANGILI" userId="89c7df381375e6aa" providerId="LiveId" clId="{002FC19B-B750-46E5-AE6C-2EDFEC68FEF2}" dt="2023-12-02T20:53:13.399" v="2415" actId="20577"/>
           <ac:spMkLst>
             <pc:docMk/>
             <pc:sldMk cId="2728347993" sldId="304"/>
@@ -1157,13 +1165,13 @@
         </pc:picChg>
       </pc:sldChg>
       <pc:sldChg chg="addSp delSp modSp mod setBg addAnim modAnim">
-        <pc:chgData name="Matteo MANGILI" userId="89c7df381375e6aa" providerId="LiveId" clId="{002FC19B-B750-46E5-AE6C-2EDFEC68FEF2}" dt="2023-12-02T20:17:41.037" v="1220"/>
+        <pc:chgData name="Matteo MANGILI" userId="89c7df381375e6aa" providerId="LiveId" clId="{002FC19B-B750-46E5-AE6C-2EDFEC68FEF2}" dt="2023-12-02T20:47:36.284" v="2193" actId="20577"/>
         <pc:sldMkLst>
           <pc:docMk/>
           <pc:sldMk cId="3568766427" sldId="306"/>
         </pc:sldMkLst>
         <pc:spChg chg="mod">
-          <ac:chgData name="Matteo MANGILI" userId="89c7df381375e6aa" providerId="LiveId" clId="{002FC19B-B750-46E5-AE6C-2EDFEC68FEF2}" dt="2023-12-02T20:13:21.147" v="1185" actId="113"/>
+          <ac:chgData name="Matteo MANGILI" userId="89c7df381375e6aa" providerId="LiveId" clId="{002FC19B-B750-46E5-AE6C-2EDFEC68FEF2}" dt="2023-12-02T20:47:36.284" v="2193" actId="20577"/>
           <ac:spMkLst>
             <pc:docMk/>
             <pc:sldMk cId="3568766427" sldId="306"/>
@@ -1291,7 +1299,7 @@
         </pc:cxnChg>
       </pc:sldChg>
       <pc:sldChg chg="addSp modSp mod setBg addAnim modAnim">
-        <pc:chgData name="Matteo MANGILI" userId="89c7df381375e6aa" providerId="LiveId" clId="{002FC19B-B750-46E5-AE6C-2EDFEC68FEF2}" dt="2023-12-02T20:17:28.613" v="1219" actId="255"/>
+        <pc:chgData name="Matteo MANGILI" userId="89c7df381375e6aa" providerId="LiveId" clId="{002FC19B-B750-46E5-AE6C-2EDFEC68FEF2}" dt="2023-12-02T20:43:01.618" v="2173" actId="20577"/>
         <pc:sldMkLst>
           <pc:docMk/>
           <pc:sldMk cId="1581940243" sldId="309"/>
@@ -1305,7 +1313,7 @@
           </ac:spMkLst>
         </pc:spChg>
         <pc:spChg chg="mod">
-          <ac:chgData name="Matteo MANGILI" userId="89c7df381375e6aa" providerId="LiveId" clId="{002FC19B-B750-46E5-AE6C-2EDFEC68FEF2}" dt="2023-12-02T20:17:17.863" v="1218" actId="14100"/>
+          <ac:chgData name="Matteo MANGILI" userId="89c7df381375e6aa" providerId="LiveId" clId="{002FC19B-B750-46E5-AE6C-2EDFEC68FEF2}" dt="2023-12-02T20:43:01.618" v="2173" actId="20577"/>
           <ac:spMkLst>
             <pc:docMk/>
             <pc:sldMk cId="1581940243" sldId="309"/>
@@ -1407,26 +1415,34 @@
           </ac:spMkLst>
         </pc:spChg>
       </pc:sldChg>
-      <pc:sldChg chg="modSp add mod">
-        <pc:chgData name="Matteo MANGILI" userId="89c7df381375e6aa" providerId="LiveId" clId="{002FC19B-B750-46E5-AE6C-2EDFEC68FEF2}" dt="2023-12-02T20:25:10.756" v="1260" actId="255"/>
+      <pc:sldChg chg="addSp delSp modSp add mod">
+        <pc:chgData name="Matteo MANGILI" userId="89c7df381375e6aa" providerId="LiveId" clId="{002FC19B-B750-46E5-AE6C-2EDFEC68FEF2}" dt="2023-12-02T20:35:48.435" v="1633" actId="14100"/>
         <pc:sldMkLst>
           <pc:docMk/>
           <pc:sldMk cId="4188911557" sldId="312"/>
         </pc:sldMkLst>
         <pc:spChg chg="mod">
-          <ac:chgData name="Matteo MANGILI" userId="89c7df381375e6aa" providerId="LiveId" clId="{002FC19B-B750-46E5-AE6C-2EDFEC68FEF2}" dt="2023-12-02T20:23:41.274" v="1253" actId="113"/>
+          <ac:chgData name="Matteo MANGILI" userId="89c7df381375e6aa" providerId="LiveId" clId="{002FC19B-B750-46E5-AE6C-2EDFEC68FEF2}" dt="2023-12-02T20:30:41.127" v="1458" actId="20577"/>
           <ac:spMkLst>
             <pc:docMk/>
             <pc:sldMk cId="4188911557" sldId="312"/>
             <ac:spMk id="2" creationId="{75031FE9-9059-4FE8-B4AC-9771F23A1B89}"/>
           </ac:spMkLst>
         </pc:spChg>
-        <pc:spChg chg="mod">
-          <ac:chgData name="Matteo MANGILI" userId="89c7df381375e6aa" providerId="LiveId" clId="{002FC19B-B750-46E5-AE6C-2EDFEC68FEF2}" dt="2023-12-02T20:25:02.034" v="1258" actId="14100"/>
+        <pc:spChg chg="del mod">
+          <ac:chgData name="Matteo MANGILI" userId="89c7df381375e6aa" providerId="LiveId" clId="{002FC19B-B750-46E5-AE6C-2EDFEC68FEF2}" dt="2023-12-02T20:32:43.465" v="1460"/>
           <ac:spMkLst>
             <pc:docMk/>
             <pc:sldMk cId="4188911557" sldId="312"/>
             <ac:spMk id="4" creationId="{0B9BE06A-2A10-766E-30FB-68BA1AE33F20}"/>
+          </ac:spMkLst>
+        </pc:spChg>
+        <pc:spChg chg="add del">
+          <ac:chgData name="Matteo MANGILI" userId="89c7df381375e6aa" providerId="LiveId" clId="{002FC19B-B750-46E5-AE6C-2EDFEC68FEF2}" dt="2023-12-02T20:34:12.655" v="1537"/>
+          <ac:spMkLst>
+            <pc:docMk/>
+            <pc:sldMk cId="4188911557" sldId="312"/>
+            <ac:spMk id="5" creationId="{8FC71FAA-508C-ECF6-B514-FCD4713DBBF1}"/>
           </ac:spMkLst>
         </pc:spChg>
         <pc:spChg chg="mod">
@@ -1437,6 +1453,30 @@
             <ac:spMk id="82" creationId="{CE36A058-BEC2-4BC5-A467-F2EB2A365051}"/>
           </ac:spMkLst>
         </pc:spChg>
+        <pc:picChg chg="add mod">
+          <ac:chgData name="Matteo MANGILI" userId="89c7df381375e6aa" providerId="LiveId" clId="{002FC19B-B750-46E5-AE6C-2EDFEC68FEF2}" dt="2023-12-02T20:34:37.445" v="1549" actId="14100"/>
+          <ac:picMkLst>
+            <pc:docMk/>
+            <pc:sldMk cId="4188911557" sldId="312"/>
+            <ac:picMk id="3" creationId="{B8057E78-C79B-B48E-DB48-B7F3C18B6C3F}"/>
+          </ac:picMkLst>
+        </pc:picChg>
+        <pc:picChg chg="add mod">
+          <ac:chgData name="Matteo MANGILI" userId="89c7df381375e6aa" providerId="LiveId" clId="{002FC19B-B750-46E5-AE6C-2EDFEC68FEF2}" dt="2023-12-02T20:34:23.235" v="1540" actId="1076"/>
+          <ac:picMkLst>
+            <pc:docMk/>
+            <pc:sldMk cId="4188911557" sldId="312"/>
+            <ac:picMk id="6" creationId="{DE0CC97B-A6DE-8CA6-E657-2E691E6C3F77}"/>
+          </ac:picMkLst>
+        </pc:picChg>
+        <pc:picChg chg="add mod">
+          <ac:chgData name="Matteo MANGILI" userId="89c7df381375e6aa" providerId="LiveId" clId="{002FC19B-B750-46E5-AE6C-2EDFEC68FEF2}" dt="2023-12-02T20:35:48.435" v="1633" actId="14100"/>
+          <ac:picMkLst>
+            <pc:docMk/>
+            <pc:sldMk cId="4188911557" sldId="312"/>
+            <ac:picMk id="7" creationId="{7AE3E7A1-BEDB-D97B-216D-E3415BE206FD}"/>
+          </ac:picMkLst>
+        </pc:picChg>
       </pc:sldChg>
     </pc:docChg>
   </pc:docChgLst>
@@ -15183,18 +15223,137 @@
           </a:bodyPr>
           <a:lstStyle/>
           <a:p>
-            <a:r>
-              <a:rPr lang="it-IT" sz="2200"/>
-              <a:t>Cosa avete usato per implementare</a:t>
-            </a:r>
-          </a:p>
-          <a:p>
-            <a:pPr lvl="1"/>
-            <a:r>
-              <a:rPr lang="it-IT" sz="2200"/>
-              <a:t>Quali parti avete implementato e quali no (ad esempio)</a:t>
-            </a:r>
-            <a:endParaRPr lang="en-US" sz="2200"/>
+            <a:pPr marL="0" indent="0">
+              <a:buNone/>
+            </a:pPr>
+            <a:r>
+              <a:rPr lang="en-US" sz="2200" dirty="0"/>
+              <a:t>Per </a:t>
+            </a:r>
+            <a:r>
+              <a:rPr lang="en-US" sz="2200" dirty="0" err="1"/>
+              <a:t>implementare</a:t>
+            </a:r>
+            <a:r>
+              <a:rPr lang="en-US" sz="2200" dirty="0"/>
+              <a:t> il Progetto </a:t>
+            </a:r>
+            <a:r>
+              <a:rPr lang="en-US" sz="2200" dirty="0" err="1"/>
+              <a:t>abbiamo</a:t>
+            </a:r>
+            <a:r>
+              <a:rPr lang="en-US" sz="2200" dirty="0"/>
+              <a:t> </a:t>
+            </a:r>
+            <a:r>
+              <a:rPr lang="en-US" sz="2200" dirty="0" err="1"/>
+              <a:t>dovuto</a:t>
+            </a:r>
+            <a:r>
+              <a:rPr lang="en-US" sz="2200" dirty="0"/>
+              <a:t> </a:t>
+            </a:r>
+            <a:r>
+              <a:rPr lang="en-US" sz="2200" dirty="0" err="1"/>
+              <a:t>specificare</a:t>
+            </a:r>
+            <a:r>
+              <a:rPr lang="en-US" sz="2200" dirty="0"/>
+              <a:t> </a:t>
+            </a:r>
+            <a:r>
+              <a:rPr lang="en-US" sz="2200" dirty="0" err="1"/>
+              <a:t>diversi</a:t>
+            </a:r>
+            <a:r>
+              <a:rPr lang="en-US" sz="2200" dirty="0"/>
+              <a:t> </a:t>
+            </a:r>
+            <a:r>
+              <a:rPr lang="en-US" sz="2200" dirty="0" err="1"/>
+              <a:t>punti</a:t>
+            </a:r>
+            <a:r>
+              <a:rPr lang="en-US" sz="2200" dirty="0"/>
+              <a:t> da </a:t>
+            </a:r>
+            <a:r>
+              <a:rPr lang="en-US" sz="2200" dirty="0" err="1"/>
+              <a:t>soddisfare</a:t>
+            </a:r>
+            <a:r>
+              <a:rPr lang="en-US" sz="2200" dirty="0"/>
+              <a:t> per la </a:t>
+            </a:r>
+            <a:r>
+              <a:rPr lang="en-US" sz="2200" dirty="0" err="1"/>
+              <a:t>riuscita</a:t>
+            </a:r>
+            <a:r>
+              <a:rPr lang="en-US" sz="2200" dirty="0"/>
+              <a:t> del software</a:t>
+            </a:r>
+          </a:p>
+          <a:p>
+            <a:pPr>
+              <a:buFont typeface="Wingdings" panose="05000000000000000000" pitchFamily="2" charset="2"/>
+              <a:buChar char="Ø"/>
+            </a:pPr>
+            <a:r>
+              <a:rPr lang="en-US" sz="2200" dirty="0" err="1"/>
+              <a:t>Registrazione</a:t>
+            </a:r>
+            <a:endParaRPr lang="en-US" sz="2200" dirty="0"/>
+          </a:p>
+          <a:p>
+            <a:pPr>
+              <a:buFont typeface="Wingdings" panose="05000000000000000000" pitchFamily="2" charset="2"/>
+              <a:buChar char="Ø"/>
+            </a:pPr>
+            <a:r>
+              <a:rPr lang="en-US" sz="2200" dirty="0" err="1"/>
+              <a:t>Autentiticazione</a:t>
+            </a:r>
+            <a:endParaRPr lang="en-US" sz="2200" dirty="0"/>
+          </a:p>
+          <a:p>
+            <a:pPr>
+              <a:buFont typeface="Wingdings" panose="05000000000000000000" pitchFamily="2" charset="2"/>
+              <a:buChar char="Ø"/>
+            </a:pPr>
+            <a:r>
+              <a:rPr lang="en-US" sz="2200" dirty="0" err="1"/>
+              <a:t>Iscrizione</a:t>
+            </a:r>
+            <a:r>
+              <a:rPr lang="en-US" sz="2200" dirty="0"/>
+              <a:t> </a:t>
+            </a:r>
+            <a:r>
+              <a:rPr lang="en-US" sz="2200" dirty="0" err="1"/>
+              <a:t>alla</a:t>
+            </a:r>
+            <a:r>
+              <a:rPr lang="en-US" sz="2200" dirty="0"/>
+              <a:t> Lista </a:t>
+            </a:r>
+            <a:r>
+              <a:rPr lang="en-US" sz="2200" dirty="0" err="1"/>
+              <a:t>Graduatoria</a:t>
+            </a:r>
+            <a:endParaRPr lang="en-US" sz="2200" dirty="0"/>
+          </a:p>
+          <a:p>
+            <a:pPr>
+              <a:buFont typeface="Wingdings" panose="05000000000000000000" pitchFamily="2" charset="2"/>
+              <a:buChar char="Ø"/>
+            </a:pPr>
+            <a:r>
+              <a:rPr lang="en-US" sz="2200"/>
+              <a:t>Verbale Medico</a:t>
+            </a:r>
+            <a:endParaRPr lang="en-US" sz="2200" dirty="0"/>
           </a:p>
         </p:txBody>
       </p:sp>
@@ -15371,9 +15530,10 @@
           <a:lstStyle/>
           <a:p>
             <a:r>
-              <a:rPr lang="en-US" sz="5400" b="1" dirty="0"/>
-              <a:t>DEMO</a:t>
-            </a:r>
+              <a:rPr lang="en-US" sz="5400" b="1" dirty="0" err="1"/>
+              <a:t>Dimostrazione</a:t>
+            </a:r>
+            <a:endParaRPr lang="en-US" sz="5400" b="1" dirty="0"/>
           </a:p>
         </p:txBody>
       </p:sp>
@@ -19655,68 +19815,115 @@
           <a:lstStyle/>
           <a:p>
             <a:r>
-              <a:rPr lang="en-US" sz="2200"/>
-              <a:t>Quali</a:t>
+              <a:rPr lang="en-US" sz="2200" dirty="0" err="1"/>
+              <a:t>Coordinamento</a:t>
             </a:r>
             <a:r>
               <a:rPr lang="en-US" sz="2200" dirty="0"/>
               <a:t> </a:t>
             </a:r>
             <a:r>
-              <a:rPr lang="en-US" sz="2200"/>
-              <a:t>difficoltà</a:t>
+              <a:rPr lang="en-US" sz="2200" dirty="0" err="1"/>
+              <a:t>tra</a:t>
             </a:r>
             <a:r>
               <a:rPr lang="en-US" sz="2200" dirty="0"/>
               <a:t> </a:t>
             </a:r>
             <a:r>
-              <a:rPr lang="en-US" sz="2200"/>
-              <a:t>avete</a:t>
+              <a:rPr lang="en-US" sz="2200" dirty="0" err="1"/>
+              <a:t>i</a:t>
+            </a:r>
+            <a:r>
+              <a:rPr lang="en-US" sz="2200" dirty="0"/>
+              <a:t> component del team </a:t>
+            </a:r>
+          </a:p>
+          <a:p>
+            <a:endParaRPr lang="en-US" sz="2200" dirty="0"/>
+          </a:p>
+          <a:p>
+            <a:r>
+              <a:rPr lang="en-US" sz="2200" dirty="0" err="1"/>
+              <a:t>Difficoltà</a:t>
             </a:r>
             <a:r>
               <a:rPr lang="en-US" sz="2200" dirty="0"/>
               <a:t> </a:t>
             </a:r>
             <a:r>
-              <a:rPr lang="en-US" sz="2200"/>
-              <a:t>incontrato</a:t>
+              <a:rPr lang="en-US" sz="2200" dirty="0" err="1"/>
+              <a:t>nell’ottenere</a:t>
+            </a:r>
+            <a:r>
+              <a:rPr lang="en-US" sz="2200" dirty="0"/>
+              <a:t> un </a:t>
+            </a:r>
+            <a:r>
+              <a:rPr lang="en-US" sz="2200" dirty="0" err="1"/>
+              <a:t>programma</a:t>
+            </a:r>
+            <a:r>
+              <a:rPr lang="en-US" sz="2200" dirty="0"/>
+              <a:t> software </a:t>
+            </a:r>
+            <a:r>
+              <a:rPr lang="en-US" sz="2200" dirty="0" err="1"/>
+              <a:t>che</a:t>
             </a:r>
             <a:r>
               <a:rPr lang="en-US" sz="2200" dirty="0"/>
               <a:t> </a:t>
             </a:r>
             <a:r>
-              <a:rPr lang="en-US" sz="2200"/>
-              <a:t>durante</a:t>
+              <a:rPr lang="en-US" sz="2200" dirty="0" err="1"/>
+              <a:t>rispondesse</a:t>
             </a:r>
             <a:r>
               <a:rPr lang="en-US" sz="2200" dirty="0"/>
-              <a:t> il </a:t>
-            </a:r>
-            <a:r>
-              <a:rPr lang="en-US" sz="2200"/>
-              <a:t>progetto</a:t>
+              <a:t> ai </a:t>
+            </a:r>
+            <a:r>
+              <a:rPr lang="en-US" sz="2200" dirty="0" err="1"/>
+              <a:t>vari</a:t>
             </a:r>
             <a:r>
               <a:rPr lang="en-US" sz="2200" dirty="0"/>
-              <a:t> (</a:t>
-            </a:r>
-            <a:r>
-              <a:rPr lang="en-US" sz="2200"/>
-              <a:t>comunicazione</a:t>
+              <a:t> </a:t>
+            </a:r>
+            <a:r>
+              <a:rPr lang="en-US" sz="2200" dirty="0" err="1"/>
+              <a:t>punti</a:t>
             </a:r>
             <a:r>
               <a:rPr lang="en-US" sz="2200" dirty="0"/>
-              <a:t>, </a:t>
-            </a:r>
-            <a:r>
-              <a:rPr lang="en-US" sz="2200"/>
-              <a:t>utilizzo</a:t>
+              <a:t> del </a:t>
+            </a:r>
+            <a:r>
+              <a:rPr lang="en-US" sz="2200" dirty="0" err="1"/>
+              <a:t>problema</a:t>
+            </a:r>
+            <a:endParaRPr lang="en-US" sz="2200" dirty="0"/>
+          </a:p>
+          <a:p>
+            <a:endParaRPr lang="en-US" sz="2200" dirty="0"/>
+          </a:p>
+          <a:p>
+            <a:r>
+              <a:rPr lang="en-US" sz="2200" dirty="0" err="1"/>
+              <a:t>Conflitto</a:t>
             </a:r>
             <a:r>
               <a:rPr lang="en-US" sz="2200" dirty="0"/>
-              <a:t> tool,….)</a:t>
+              <a:t> </a:t>
+            </a:r>
+            <a:r>
+              <a:rPr lang="en-US" sz="2200" dirty="0" err="1"/>
+              <a:t>nell’utilizzo</a:t>
+            </a:r>
+            <a:r>
+              <a:rPr lang="en-US" sz="2200" dirty="0"/>
+              <a:t> di GitHub </a:t>
             </a:r>
           </a:p>
         </p:txBody>
@@ -19889,7 +20096,7 @@
         </p:spPr>
         <p:txBody>
           <a:bodyPr vert="horz" lIns="91440" tIns="45720" rIns="91440" bIns="45720" rtlCol="0">
-            <a:normAutofit fontScale="90000"/>
+            <a:normAutofit/>
           </a:bodyPr>
           <a:lstStyle/>
           <a:p>
@@ -19908,40 +20115,7 @@
                 <a:ea typeface="+mj-ea"/>
                 <a:cs typeface="+mj-cs"/>
               </a:rPr>
-              <a:t>Paradigma di programmazione/</a:t>
-            </a:r>
-            <a:br>
-              <a:rPr kumimoji="0" lang="it-IT" sz="5400" b="1" i="0" u="none" strike="noStrike" kern="1200" cap="none" spc="0" normalizeH="0" baseline="0" noProof="0" dirty="0">
-                <a:ln>
-                  <a:noFill/>
-                </a:ln>
-                <a:solidFill>
-                  <a:prstClr val="black"/>
-                </a:solidFill>
-                <a:effectLst/>
-                <a:uLnTx/>
-                <a:uFillTx/>
-                <a:latin typeface="Calibri Light" panose="020F0302020204030204"/>
-                <a:ea typeface="+mj-ea"/>
-                <a:cs typeface="+mj-cs"/>
-              </a:rPr>
-            </a:br>
-            <a:r>
-              <a:rPr kumimoji="0" lang="it-IT" sz="5400" b="1" i="0" u="none" strike="noStrike" kern="1200" cap="none" spc="0" normalizeH="0" baseline="0" noProof="0" dirty="0">
-                <a:ln>
-                  <a:noFill/>
-                </a:ln>
-                <a:solidFill>
-                  <a:prstClr val="black"/>
-                </a:solidFill>
-                <a:effectLst/>
-                <a:uLnTx/>
-                <a:uFillTx/>
-                <a:latin typeface="Calibri Light" panose="020F0302020204030204"/>
-                <a:ea typeface="+mj-ea"/>
-                <a:cs typeface="+mj-cs"/>
-              </a:rPr>
-              <a:t>modellazione utilizzato e tools</a:t>
+              <a:t>Paradigma di programmazione</a:t>
             </a:r>
             <a:endParaRPr lang="en-US" sz="5400" b="1" dirty="0"/>
           </a:p>
@@ -20585,101 +20759,38 @@
           </a:p>
         </p:txBody>
       </p:sp>
-      <p:sp>
-        <p:nvSpPr>
-          <p:cNvPr id="4" name="Content Placeholder 3">
+      <p:pic>
+        <p:nvPicPr>
+          <p:cNvPr id="3" name="Segnaposto contenuto 2">
             <a:extLst>
               <a:ext uri="{FF2B5EF4-FFF2-40B4-BE49-F238E27FC236}">
-                <a16:creationId xmlns:a16="http://schemas.microsoft.com/office/drawing/2014/main" id="{0B9BE06A-2A10-766E-30FB-68BA1AE33F20}"/>
+                <a16:creationId xmlns:a16="http://schemas.microsoft.com/office/drawing/2014/main" id="{B8057E78-C79B-B48E-DB48-B7F3C18B6C3F}"/>
               </a:ext>
             </a:extLst>
           </p:cNvPr>
-          <p:cNvSpPr>
-            <a:spLocks noGrp="1"/>
-          </p:cNvSpPr>
+          <p:cNvPicPr>
+            <a:picLocks noGrp="1" noChangeAspect="1"/>
+          </p:cNvPicPr>
           <p:nvPr>
             <p:ph idx="1"/>
           </p:nvPr>
-        </p:nvSpPr>
+        </p:nvPicPr>
+        <p:blipFill>
+          <a:blip r:embed="rId3"/>
+          <a:stretch>
+            <a:fillRect/>
+          </a:stretch>
+        </p:blipFill>
         <p:spPr>
           <a:xfrm>
-            <a:off x="838200" y="1929384"/>
-            <a:ext cx="10515600" cy="3977267"/>
+            <a:off x="581899" y="1928061"/>
+            <a:ext cx="2833105" cy="2376000"/>
           </a:xfrm>
+          <a:prstGeom prst="rect">
+            <a:avLst/>
+          </a:prstGeom>
         </p:spPr>
-        <p:txBody>
-          <a:bodyPr vert="horz" lIns="91440" tIns="45720" rIns="91440" bIns="45720" rtlCol="0">
-            <a:normAutofit/>
-          </a:bodyPr>
-          <a:lstStyle/>
-          <a:p>
-            <a:r>
-              <a:rPr lang="en-US" sz="2200"/>
-              <a:t>Quali</a:t>
-            </a:r>
-            <a:r>
-              <a:rPr lang="en-US" sz="2200" dirty="0"/>
-              <a:t> </a:t>
-            </a:r>
-            <a:r>
-              <a:rPr lang="en-US" sz="2200"/>
-              <a:t>difficoltà</a:t>
-            </a:r>
-            <a:r>
-              <a:rPr lang="en-US" sz="2200" dirty="0"/>
-              <a:t> </a:t>
-            </a:r>
-            <a:r>
-              <a:rPr lang="en-US" sz="2200"/>
-              <a:t>avete</a:t>
-            </a:r>
-            <a:r>
-              <a:rPr lang="en-US" sz="2200" dirty="0"/>
-              <a:t> </a:t>
-            </a:r>
-            <a:r>
-              <a:rPr lang="en-US" sz="2200"/>
-              <a:t>incontrato</a:t>
-            </a:r>
-            <a:r>
-              <a:rPr lang="en-US" sz="2200" dirty="0"/>
-              <a:t> </a:t>
-            </a:r>
-            <a:r>
-              <a:rPr lang="en-US" sz="2200"/>
-              <a:t>durante</a:t>
-            </a:r>
-            <a:r>
-              <a:rPr lang="en-US" sz="2200" dirty="0"/>
-              <a:t> il </a:t>
-            </a:r>
-            <a:r>
-              <a:rPr lang="en-US" sz="2200"/>
-              <a:t>progetto</a:t>
-            </a:r>
-            <a:r>
-              <a:rPr lang="en-US" sz="2200" dirty="0"/>
-              <a:t> (</a:t>
-            </a:r>
-            <a:r>
-              <a:rPr lang="en-US" sz="2200"/>
-              <a:t>comunicazione</a:t>
-            </a:r>
-            <a:r>
-              <a:rPr lang="en-US" sz="2200" dirty="0"/>
-              <a:t>, </a:t>
-            </a:r>
-            <a:r>
-              <a:rPr lang="en-US" sz="2200"/>
-              <a:t>utilizzo</a:t>
-            </a:r>
-            <a:r>
-              <a:rPr lang="en-US" sz="2200" dirty="0"/>
-              <a:t> tool,….)</a:t>
-            </a:r>
-          </a:p>
-        </p:txBody>
-      </p:sp>
+      </p:pic>
       <p:sp>
         <p:nvSpPr>
           <p:cNvPr id="82" name="Segnaposto numero diapositiva 81">
@@ -20726,6 +20837,66 @@
           </a:p>
         </p:txBody>
       </p:sp>
+      <p:pic>
+        <p:nvPicPr>
+          <p:cNvPr id="6" name="Immagine 5">
+            <a:extLst>
+              <a:ext uri="{FF2B5EF4-FFF2-40B4-BE49-F238E27FC236}">
+                <a16:creationId xmlns:a16="http://schemas.microsoft.com/office/drawing/2014/main" id="{DE0CC97B-A6DE-8CA6-E657-2E691E6C3F77}"/>
+              </a:ext>
+            </a:extLst>
+          </p:cNvPr>
+          <p:cNvPicPr>
+            <a:picLocks noChangeAspect="1"/>
+          </p:cNvPicPr>
+          <p:nvPr/>
+        </p:nvPicPr>
+        <p:blipFill>
+          <a:blip r:embed="rId4"/>
+          <a:stretch>
+            <a:fillRect/>
+          </a:stretch>
+        </p:blipFill>
+        <p:spPr>
+          <a:xfrm>
+            <a:off x="3901782" y="2057360"/>
+            <a:ext cx="2438400" cy="2438400"/>
+          </a:xfrm>
+          <a:prstGeom prst="rect">
+            <a:avLst/>
+          </a:prstGeom>
+        </p:spPr>
+      </p:pic>
+      <p:pic>
+        <p:nvPicPr>
+          <p:cNvPr id="7" name="Immagine 6">
+            <a:extLst>
+              <a:ext uri="{FF2B5EF4-FFF2-40B4-BE49-F238E27FC236}">
+                <a16:creationId xmlns:a16="http://schemas.microsoft.com/office/drawing/2014/main" id="{7AE3E7A1-BEDB-D97B-216D-E3415BE206FD}"/>
+              </a:ext>
+            </a:extLst>
+          </p:cNvPr>
+          <p:cNvPicPr>
+            <a:picLocks noChangeAspect="1"/>
+          </p:cNvPicPr>
+          <p:nvPr/>
+        </p:nvPicPr>
+        <p:blipFill>
+          <a:blip r:embed="rId5"/>
+          <a:stretch>
+            <a:fillRect/>
+          </a:stretch>
+        </p:blipFill>
+        <p:spPr>
+          <a:xfrm>
+            <a:off x="7389845" y="2000061"/>
+            <a:ext cx="2448000" cy="2448000"/>
+          </a:xfrm>
+          <a:prstGeom prst="rect">
+            <a:avLst/>
+          </a:prstGeom>
+        </p:spPr>
+      </p:pic>
     </p:spTree>
     <p:extLst>
       <p:ext uri="{BB962C8B-B14F-4D97-AF65-F5344CB8AC3E}">
@@ -21526,9 +21697,12 @@
           </a:bodyPr>
           <a:lstStyle/>
           <a:p>
+            <a:pPr marL="0" indent="0">
+              <a:buNone/>
+            </a:pPr>
             <a:r>
               <a:rPr lang="it-IT" sz="2200" dirty="0"/>
-              <a:t>Quale tool avete usato per software </a:t>
+              <a:t>Per il software </a:t>
             </a:r>
             <a:r>
               <a:rPr lang="it-IT" sz="2200" dirty="0" err="1"/>
@@ -21536,15 +21710,8 @@
             </a:r>
             <a:r>
               <a:rPr lang="it-IT" sz="2200" dirty="0"/>
-              <a:t> management (GitHub,….????)</a:t>
-            </a:r>
-          </a:p>
-          <a:p>
-            <a:r>
-              <a:rPr lang="it-IT" sz="2200" dirty="0"/>
-              <a:t>Come lo avete usato?</a:t>
-            </a:r>
-            <a:endParaRPr lang="en-US" sz="2200" dirty="0"/>
+              <a:t> management è stato utilizzato GitHub come programma principale</a:t>
+            </a:r>
           </a:p>
         </p:txBody>
       </p:sp>
@@ -23268,21 +23435,324 @@
         </p:nvSpPr>
         <p:spPr>
           <a:xfrm>
-            <a:off x="838200" y="1929384"/>
-            <a:ext cx="10515600" cy="3729990"/>
+            <a:off x="499872" y="1929384"/>
+            <a:ext cx="10853928" cy="4648698"/>
           </a:xfrm>
         </p:spPr>
         <p:txBody>
           <a:bodyPr vert="horz" lIns="91440" tIns="45720" rIns="91440" bIns="45720" rtlCol="0">
-            <a:normAutofit/>
+            <a:normAutofit lnSpcReduction="10000"/>
           </a:bodyPr>
           <a:lstStyle/>
           <a:p>
-            <a:r>
-              <a:rPr lang="it-IT" sz="2200" dirty="0">
+            <a:pPr marL="0" indent="0">
+              <a:buNone/>
+            </a:pPr>
+            <a:r>
+              <a:rPr lang="en-US" sz="2200" dirty="0">
                 <a:cs typeface="Calibri"/>
               </a:rPr>
-              <a:t>Spiegare come avete estratto i requisiti e dove li avete specificati</a:t>
+              <a:t>Le </a:t>
+            </a:r>
+            <a:r>
+              <a:rPr lang="en-US" sz="2200" dirty="0" err="1">
+                <a:cs typeface="Calibri"/>
+              </a:rPr>
+              <a:t>informazioni</a:t>
+            </a:r>
+            <a:r>
+              <a:rPr lang="en-US" sz="2200" dirty="0">
+                <a:cs typeface="Calibri"/>
+              </a:rPr>
+              <a:t> </a:t>
+            </a:r>
+            <a:r>
+              <a:rPr lang="en-US" sz="2200" dirty="0" err="1">
+                <a:cs typeface="Calibri"/>
+              </a:rPr>
+              <a:t>generali</a:t>
+            </a:r>
+            <a:r>
+              <a:rPr lang="en-US" sz="2200" dirty="0">
+                <a:cs typeface="Calibri"/>
+              </a:rPr>
+              <a:t> per </a:t>
+            </a:r>
+            <a:r>
+              <a:rPr lang="en-US" sz="2200" dirty="0" err="1">
+                <a:cs typeface="Calibri"/>
+              </a:rPr>
+              <a:t>lavorare</a:t>
+            </a:r>
+            <a:r>
+              <a:rPr lang="en-US" sz="2200" dirty="0">
+                <a:cs typeface="Calibri"/>
+              </a:rPr>
+              <a:t> al Sistema le </a:t>
+            </a:r>
+            <a:r>
+              <a:rPr lang="en-US" sz="2200" dirty="0" err="1">
+                <a:cs typeface="Calibri"/>
+              </a:rPr>
+              <a:t>abbiamo</a:t>
+            </a:r>
+            <a:r>
+              <a:rPr lang="en-US" sz="2200" dirty="0">
+                <a:cs typeface="Calibri"/>
+              </a:rPr>
+              <a:t> prese da </a:t>
+            </a:r>
+            <a:r>
+              <a:rPr lang="en-US" sz="2200" dirty="0" err="1">
+                <a:cs typeface="Calibri"/>
+              </a:rPr>
+              <a:t>un’intervista</a:t>
+            </a:r>
+            <a:r>
+              <a:rPr lang="en-US" sz="2200" dirty="0">
+                <a:cs typeface="Calibri"/>
+              </a:rPr>
+              <a:t> </a:t>
+            </a:r>
+            <a:r>
+              <a:rPr lang="en-US" sz="2200" dirty="0" err="1">
+                <a:cs typeface="Calibri"/>
+              </a:rPr>
+              <a:t>effettuata</a:t>
+            </a:r>
+            <a:r>
+              <a:rPr lang="en-US" sz="2200" dirty="0">
+                <a:cs typeface="Calibri"/>
+              </a:rPr>
+              <a:t> dal </a:t>
+            </a:r>
+            <a:r>
+              <a:rPr lang="en-US" sz="2200" dirty="0" err="1">
+                <a:cs typeface="Calibri"/>
+              </a:rPr>
+              <a:t>responsabile</a:t>
+            </a:r>
+            <a:r>
+              <a:rPr lang="en-US" sz="2200" dirty="0">
+                <a:cs typeface="Calibri"/>
+              </a:rPr>
+              <a:t> </a:t>
+            </a:r>
+            <a:r>
+              <a:rPr lang="en-US" sz="2200" dirty="0" err="1">
+                <a:cs typeface="Calibri"/>
+              </a:rPr>
+              <a:t>Cattaneo</a:t>
+            </a:r>
+            <a:r>
+              <a:rPr lang="en-US" sz="2200" dirty="0">
+                <a:cs typeface="Calibri"/>
+              </a:rPr>
+              <a:t> verso </a:t>
+            </a:r>
+            <a:r>
+              <a:rPr lang="en-US" sz="2200" dirty="0" err="1">
+                <a:cs typeface="Calibri"/>
+              </a:rPr>
+              <a:t>un’infermiera</a:t>
+            </a:r>
+            <a:r>
+              <a:rPr lang="en-US" sz="2200" dirty="0">
+                <a:cs typeface="Calibri"/>
+              </a:rPr>
+              <a:t> </a:t>
+            </a:r>
+            <a:r>
+              <a:rPr lang="en-US" sz="2200" dirty="0" err="1">
+                <a:cs typeface="Calibri"/>
+              </a:rPr>
+              <a:t>dell’Ospedale</a:t>
+            </a:r>
+            <a:r>
+              <a:rPr lang="en-US" sz="2200" dirty="0">
+                <a:cs typeface="Calibri"/>
+              </a:rPr>
+              <a:t> Papa Giovanni XXIII di Bergamo (BG).</a:t>
+            </a:r>
+          </a:p>
+          <a:p>
+            <a:pPr marL="0" indent="0">
+              <a:buNone/>
+            </a:pPr>
+            <a:endParaRPr lang="en-US" sz="2200" dirty="0">
+              <a:cs typeface="Calibri"/>
+            </a:endParaRPr>
+          </a:p>
+          <a:p>
+            <a:pPr marL="0" indent="0">
+              <a:buNone/>
+            </a:pPr>
+            <a:r>
+              <a:rPr lang="en-US" sz="2200" b="1" dirty="0" err="1">
+                <a:cs typeface="Calibri"/>
+              </a:rPr>
+              <a:t>Requisiti</a:t>
+            </a:r>
+            <a:r>
+              <a:rPr lang="en-US" sz="2200" b="1" dirty="0">
+                <a:cs typeface="Calibri"/>
+              </a:rPr>
+              <a:t> </a:t>
+            </a:r>
+            <a:r>
+              <a:rPr lang="en-US" sz="2200" b="1" dirty="0" err="1">
+                <a:cs typeface="Calibri"/>
+              </a:rPr>
+              <a:t>funzionali</a:t>
+            </a:r>
+            <a:r>
+              <a:rPr lang="en-US" sz="2200" b="1" dirty="0">
+                <a:cs typeface="Calibri"/>
+              </a:rPr>
+              <a:t>:</a:t>
+            </a:r>
+          </a:p>
+          <a:p>
+            <a:r>
+              <a:rPr lang="en-US" sz="2200" dirty="0" err="1">
+                <a:cs typeface="Calibri"/>
+              </a:rPr>
+              <a:t>Funzionalità</a:t>
+            </a:r>
+            <a:r>
+              <a:rPr lang="en-US" sz="2200" dirty="0">
+                <a:cs typeface="Calibri"/>
+              </a:rPr>
+              <a:t> del Sistema</a:t>
+            </a:r>
+          </a:p>
+          <a:p>
+            <a:r>
+              <a:rPr lang="en-US" sz="2200" dirty="0" err="1">
+                <a:cs typeface="Calibri"/>
+              </a:rPr>
+              <a:t>Corretta</a:t>
+            </a:r>
+            <a:r>
+              <a:rPr lang="en-US" sz="2200" dirty="0">
+                <a:cs typeface="Calibri"/>
+              </a:rPr>
+              <a:t> </a:t>
+            </a:r>
+            <a:r>
+              <a:rPr lang="en-US" sz="2200" dirty="0" err="1">
+                <a:cs typeface="Calibri"/>
+              </a:rPr>
+              <a:t>Correlazione</a:t>
+            </a:r>
+            <a:r>
+              <a:rPr lang="en-US" sz="2200" dirty="0">
+                <a:cs typeface="Calibri"/>
+              </a:rPr>
+              <a:t> </a:t>
+            </a:r>
+            <a:r>
+              <a:rPr lang="en-US" sz="2200" dirty="0" err="1">
+                <a:cs typeface="Calibri"/>
+              </a:rPr>
+              <a:t>tra</a:t>
+            </a:r>
+            <a:r>
+              <a:rPr lang="en-US" sz="2200" dirty="0">
+                <a:cs typeface="Calibri"/>
+              </a:rPr>
+              <a:t> le </a:t>
+            </a:r>
+            <a:r>
+              <a:rPr lang="en-US" sz="2200" dirty="0" err="1">
+                <a:cs typeface="Calibri"/>
+              </a:rPr>
+              <a:t>varie</a:t>
+            </a:r>
+            <a:r>
+              <a:rPr lang="en-US" sz="2200" dirty="0">
+                <a:cs typeface="Calibri"/>
+              </a:rPr>
+              <a:t> </a:t>
+            </a:r>
+            <a:r>
+              <a:rPr lang="en-US" sz="2200" dirty="0" err="1">
+                <a:cs typeface="Calibri"/>
+              </a:rPr>
+              <a:t>classi</a:t>
+            </a:r>
+            <a:r>
+              <a:rPr lang="en-US" sz="2200" dirty="0">
+                <a:cs typeface="Calibri"/>
+              </a:rPr>
+              <a:t> del Sistema</a:t>
+            </a:r>
+          </a:p>
+          <a:p>
+            <a:pPr marL="0" indent="0">
+              <a:buNone/>
+            </a:pPr>
+            <a:endParaRPr lang="en-US" sz="2200" dirty="0">
+              <a:cs typeface="Calibri"/>
+            </a:endParaRPr>
+          </a:p>
+          <a:p>
+            <a:pPr marL="0" indent="0">
+              <a:buNone/>
+            </a:pPr>
+            <a:r>
+              <a:rPr lang="en-US" sz="2200" b="1" dirty="0" err="1">
+                <a:cs typeface="Calibri"/>
+              </a:rPr>
+              <a:t>Requisiti</a:t>
+            </a:r>
+            <a:r>
+              <a:rPr lang="en-US" sz="2200" b="1" dirty="0">
+                <a:cs typeface="Calibri"/>
+              </a:rPr>
+              <a:t> non </a:t>
+            </a:r>
+            <a:r>
+              <a:rPr lang="en-US" sz="2200" b="1" dirty="0" err="1">
+                <a:cs typeface="Calibri"/>
+              </a:rPr>
+              <a:t>funzionali</a:t>
+            </a:r>
+            <a:endParaRPr lang="en-US" sz="2200" b="1" dirty="0">
+              <a:cs typeface="Calibri"/>
+            </a:endParaRPr>
+          </a:p>
+          <a:p>
+            <a:r>
+              <a:rPr lang="en-US" sz="2200" dirty="0" err="1">
+                <a:cs typeface="Calibri"/>
+              </a:rPr>
+              <a:t>Accessibilità</a:t>
+            </a:r>
+            <a:endParaRPr lang="en-US" sz="2200" dirty="0">
+              <a:cs typeface="Calibri"/>
+            </a:endParaRPr>
+          </a:p>
+          <a:p>
+            <a:r>
+              <a:rPr lang="en-US" sz="2200" dirty="0" err="1">
+                <a:cs typeface="Calibri"/>
+              </a:rPr>
+              <a:t>Sicurezza</a:t>
+            </a:r>
+            <a:r>
+              <a:rPr lang="en-US" sz="2200" dirty="0">
+                <a:cs typeface="Calibri"/>
+              </a:rPr>
+              <a:t> del Sistema</a:t>
+            </a:r>
+          </a:p>
+          <a:p>
+            <a:r>
+              <a:rPr lang="en-US" sz="2200" dirty="0" err="1">
+                <a:cs typeface="Calibri"/>
+              </a:rPr>
+              <a:t>Qualità</a:t>
             </a:r>
             <a:endParaRPr lang="en-US" sz="2200" dirty="0">
               <a:cs typeface="Calibri"/>
@@ -24108,42 +24578,38 @@
           </a:p>
         </p:txBody>
       </p:sp>
-      <p:sp>
-        <p:nvSpPr>
-          <p:cNvPr id="4" name="Content Placeholder 3">
+      <p:pic>
+        <p:nvPicPr>
+          <p:cNvPr id="3" name="Segnaposto contenuto 2">
             <a:extLst>
               <a:ext uri="{FF2B5EF4-FFF2-40B4-BE49-F238E27FC236}">
-                <a16:creationId xmlns:a16="http://schemas.microsoft.com/office/drawing/2014/main" id="{49E5AF19-2813-23F3-53D8-44D5983D20DA}"/>
+                <a16:creationId xmlns:a16="http://schemas.microsoft.com/office/drawing/2014/main" id="{DF52D774-0AF5-3D21-AF89-908B316763E3}"/>
               </a:ext>
             </a:extLst>
           </p:cNvPr>
-          <p:cNvSpPr>
-            <a:spLocks noGrp="1"/>
-          </p:cNvSpPr>
+          <p:cNvPicPr>
+            <a:picLocks noGrp="1" noChangeAspect="1"/>
+          </p:cNvPicPr>
           <p:nvPr>
             <p:ph idx="1"/>
           </p:nvPr>
-        </p:nvSpPr>
+        </p:nvPicPr>
+        <p:blipFill>
+          <a:blip r:embed="rId3"/>
+          <a:stretch>
+            <a:fillRect/>
+          </a:stretch>
+        </p:blipFill>
         <p:spPr>
           <a:xfrm>
-            <a:off x="838200" y="1929384"/>
-            <a:ext cx="10515600" cy="3605403"/>
+            <a:off x="838200" y="1978430"/>
+            <a:ext cx="4200525" cy="1714500"/>
           </a:xfrm>
+          <a:prstGeom prst="rect">
+            <a:avLst/>
+          </a:prstGeom>
         </p:spPr>
-        <p:txBody>
-          <a:bodyPr>
-            <a:normAutofit/>
-          </a:bodyPr>
-          <a:lstStyle/>
-          <a:p>
-            <a:r>
-              <a:rPr lang="it-IT" sz="2200" dirty="0"/>
-              <a:t>Spiegare lo stile architetturale utilizzato</a:t>
-            </a:r>
-            <a:endParaRPr lang="en-US" sz="2200" dirty="0"/>
-          </a:p>
-        </p:txBody>
-      </p:sp>
+      </p:pic>
       <p:sp>
         <p:nvSpPr>
           <p:cNvPr id="82" name="Segnaposto numero diapositiva 81">
@@ -25949,15 +26415,6 @@
 </file>
 
 <file path=customXml/item1.xml><?xml version="1.0" encoding="utf-8"?>
-<?mso-contentType ?>
-<FormTemplates xmlns="http://schemas.microsoft.com/sharepoint/v3/contenttype/forms">
-  <Display>DocumentLibraryForm</Display>
-  <Edit>DocumentLibraryForm</Edit>
-  <New>DocumentLibraryForm</New>
-</FormTemplates>
-</file>
-
-<file path=customXml/item2.xml><?xml version="1.0" encoding="utf-8"?>
 <ct:contentTypeSchema xmlns:ct="http://schemas.microsoft.com/office/2006/metadata/contentType" xmlns:ma="http://schemas.microsoft.com/office/2006/metadata/properties/metaAttributes" ct:_="" ma:_="" ma:contentTypeName="Documento" ma:contentTypeID="0x0101007CE6213B20D2F945B0D1473923EE410F" ma:contentTypeVersion="7" ma:contentTypeDescription="Creare un nuovo documento." ma:contentTypeScope="" ma:versionID="dc8ac43e96b461727accd63cf925a5cf">
   <xsd:schema xmlns:xsd="http://www.w3.org/2001/XMLSchema" xmlns:xs="http://www.w3.org/2001/XMLSchema" xmlns:p="http://schemas.microsoft.com/office/2006/metadata/properties" xmlns:ns2="243f3390-b919-40e8-8195-3613e8527352" targetNamespace="http://schemas.microsoft.com/office/2006/metadata/properties" ma:root="true" ma:fieldsID="1987007e621e1b24d40e437f012b913d" ns2:_="">
     <xsd:import namespace="243f3390-b919-40e8-8195-3613e8527352"/>
@@ -26119,6 +26576,15 @@
 </ct:contentTypeSchema>
 </file>
 
+<file path=customXml/item2.xml><?xml version="1.0" encoding="utf-8"?>
+<?mso-contentType ?>
+<FormTemplates xmlns="http://schemas.microsoft.com/sharepoint/v3/contenttype/forms">
+  <Display>DocumentLibraryForm</Display>
+  <Edit>DocumentLibraryForm</Edit>
+  <New>DocumentLibraryForm</New>
+</FormTemplates>
+</file>
+
 <file path=customXml/item3.xml><?xml version="1.0" encoding="utf-8"?>
 <p:properties xmlns:p="http://schemas.microsoft.com/office/2006/metadata/properties" xmlns:xsi="http://www.w3.org/2001/XMLSchema-instance" xmlns:pc="http://schemas.microsoft.com/office/infopath/2007/PartnerControls">
   <documentManagement/>
@@ -26126,14 +26592,6 @@
 </file>
 
 <file path=customXml/itemProps1.xml><?xml version="1.0" encoding="utf-8"?>
-<ds:datastoreItem xmlns:ds="http://schemas.openxmlformats.org/officeDocument/2006/customXml" ds:itemID="{42BC90D6-94CF-42F7-AAC4-9CF6824C54D5}">
-  <ds:schemaRefs>
-    <ds:schemaRef ds:uri="http://schemas.microsoft.com/sharepoint/v3/contenttype/forms"/>
-  </ds:schemaRefs>
-</ds:datastoreItem>
-</file>
-
-<file path=customXml/itemProps2.xml><?xml version="1.0" encoding="utf-8"?>
 <ds:datastoreItem xmlns:ds="http://schemas.openxmlformats.org/officeDocument/2006/customXml" ds:itemID="{1A503E23-9696-4358-8F00-F7F66AC755EB}">
   <ds:schemaRefs>
     <ds:schemaRef ds:uri="http://schemas.microsoft.com/office/2006/metadata/contentType"/>
@@ -26147,6 +26605,14 @@
     <ds:schemaRef ds:uri="http://purl.org/dc/elements/1.1/"/>
     <ds:schemaRef ds:uri="http://purl.org/dc/terms/"/>
     <ds:schemaRef ds:uri="http://schemas.microsoft.com/internal/obd"/>
+  </ds:schemaRefs>
+</ds:datastoreItem>
+</file>
+
+<file path=customXml/itemProps2.xml><?xml version="1.0" encoding="utf-8"?>
+<ds:datastoreItem xmlns:ds="http://schemas.openxmlformats.org/officeDocument/2006/customXml" ds:itemID="{42BC90D6-94CF-42F7-AAC4-9CF6824C54D5}">
+  <ds:schemaRefs>
+    <ds:schemaRef ds:uri="http://schemas.microsoft.com/sharepoint/v3/contenttype/forms"/>
   </ds:schemaRefs>
 </ds:datastoreItem>
 </file>

</xml_diff>

<commit_message>
Update Presentazione Power Point
</commit_message>
<xml_diff>
--- a/Presentazione_Progetto.pptx
+++ b/Presentazione_Progetto.pptx
@@ -160,7 +160,7 @@
 <file path=ppt/revisionInfo.xml><?xml version="1.0" encoding="utf-8"?>
 <p1510:revInfo xmlns:a="http://schemas.openxmlformats.org/drawingml/2006/main" xmlns:r="http://schemas.openxmlformats.org/officeDocument/2006/relationships" xmlns:p1510="http://schemas.microsoft.com/office/powerpoint/2015/10/main">
   <p1510:revLst>
-    <p1510:client id="{002FC19B-B750-46E5-AE6C-2EDFEC68FEF2}" v="37" dt="2023-12-09T11:32:41.521"/>
+    <p1510:client id="{002FC19B-B750-46E5-AE6C-2EDFEC68FEF2}" v="59" dt="2023-12-10T18:34:45.147"/>
   </p1510:revLst>
 </p1510:revInfo>
 </file>
@@ -169,8 +169,8 @@
 <pc:chgInfo xmlns:a="http://schemas.openxmlformats.org/drawingml/2006/main" xmlns:r="http://schemas.openxmlformats.org/officeDocument/2006/relationships" xmlns:ac="http://schemas.microsoft.com/office/drawing/2013/main/command" xmlns:pc="http://schemas.microsoft.com/office/powerpoint/2013/main/command">
   <pc:docChgLst>
     <pc:chgData name="Matteo MANGILI" userId="89c7df381375e6aa" providerId="LiveId" clId="{002FC19B-B750-46E5-AE6C-2EDFEC68FEF2}"/>
-    <pc:docChg chg="undo custSel addSld delSld modSld">
-      <pc:chgData name="Matteo MANGILI" userId="89c7df381375e6aa" providerId="LiveId" clId="{002FC19B-B750-46E5-AE6C-2EDFEC68FEF2}" dt="2023-12-09T11:37:27.128" v="4268" actId="20577"/>
+    <pc:docChg chg="undo redo custSel addSld delSld modSld">
+      <pc:chgData name="Matteo MANGILI" userId="89c7df381375e6aa" providerId="LiveId" clId="{002FC19B-B750-46E5-AE6C-2EDFEC68FEF2}" dt="2023-12-10T18:39:56.220" v="5034" actId="20577"/>
       <pc:docMkLst>
         <pc:docMk/>
       </pc:docMkLst>
@@ -309,7 +309,7 @@
         </pc:picChg>
       </pc:sldChg>
       <pc:sldChg chg="addSp delSp modSp mod setBg addAnim delAnim modAnim delDesignElem chgLayout">
-        <pc:chgData name="Matteo MANGILI" userId="89c7df381375e6aa" providerId="LiveId" clId="{002FC19B-B750-46E5-AE6C-2EDFEC68FEF2}" dt="2023-12-09T11:19:28.518" v="3741" actId="5793"/>
+        <pc:chgData name="Matteo MANGILI" userId="89c7df381375e6aa" providerId="LiveId" clId="{002FC19B-B750-46E5-AE6C-2EDFEC68FEF2}" dt="2023-12-10T18:21:59.525" v="4304" actId="20577"/>
         <pc:sldMkLst>
           <pc:docMk/>
           <pc:sldMk cId="1249612630" sldId="297"/>
@@ -331,7 +331,7 @@
           </ac:spMkLst>
         </pc:spChg>
         <pc:spChg chg="mod ord">
-          <ac:chgData name="Matteo MANGILI" userId="89c7df381375e6aa" providerId="LiveId" clId="{002FC19B-B750-46E5-AE6C-2EDFEC68FEF2}" dt="2023-12-09T11:19:28.518" v="3741" actId="5793"/>
+          <ac:chgData name="Matteo MANGILI" userId="89c7df381375e6aa" providerId="LiveId" clId="{002FC19B-B750-46E5-AE6C-2EDFEC68FEF2}" dt="2023-12-10T18:21:59.525" v="4304" actId="20577"/>
           <ac:spMkLst>
             <pc:docMk/>
             <pc:sldMk cId="1249612630" sldId="297"/>
@@ -556,7 +556,7 @@
         </pc:picChg>
       </pc:sldChg>
       <pc:sldChg chg="addSp modSp mod setBg">
-        <pc:chgData name="Matteo MANGILI" userId="89c7df381375e6aa" providerId="LiveId" clId="{002FC19B-B750-46E5-AE6C-2EDFEC68FEF2}" dt="2023-12-09T11:21:49.001" v="3911" actId="20577"/>
+        <pc:chgData name="Matteo MANGILI" userId="89c7df381375e6aa" providerId="LiveId" clId="{002FC19B-B750-46E5-AE6C-2EDFEC68FEF2}" dt="2023-12-10T18:26:37.679" v="4573" actId="20577"/>
         <pc:sldMkLst>
           <pc:docMk/>
           <pc:sldMk cId="3996999348" sldId="298"/>
@@ -570,7 +570,7 @@
           </ac:spMkLst>
         </pc:spChg>
         <pc:spChg chg="mod">
-          <ac:chgData name="Matteo MANGILI" userId="89c7df381375e6aa" providerId="LiveId" clId="{002FC19B-B750-46E5-AE6C-2EDFEC68FEF2}" dt="2023-12-09T11:21:49.001" v="3911" actId="20577"/>
+          <ac:chgData name="Matteo MANGILI" userId="89c7df381375e6aa" providerId="LiveId" clId="{002FC19B-B750-46E5-AE6C-2EDFEC68FEF2}" dt="2023-12-10T18:26:37.679" v="4573" actId="20577"/>
           <ac:spMkLst>
             <pc:docMk/>
             <pc:sldMk cId="3996999348" sldId="298"/>
@@ -976,7 +976,7 @@
         </pc:spChg>
       </pc:sldChg>
       <pc:sldChg chg="addSp modSp mod setBg">
-        <pc:chgData name="Matteo MANGILI" userId="89c7df381375e6aa" providerId="LiveId" clId="{002FC19B-B750-46E5-AE6C-2EDFEC68FEF2}" dt="2023-12-09T11:37:27.128" v="4268" actId="20577"/>
+        <pc:chgData name="Matteo MANGILI" userId="89c7df381375e6aa" providerId="LiveId" clId="{002FC19B-B750-46E5-AE6C-2EDFEC68FEF2}" dt="2023-12-10T18:39:56.220" v="5034" actId="20577"/>
         <pc:sldMkLst>
           <pc:docMk/>
           <pc:sldMk cId="2728347993" sldId="304"/>
@@ -990,7 +990,7 @@
           </ac:spMkLst>
         </pc:spChg>
         <pc:spChg chg="mod">
-          <ac:chgData name="Matteo MANGILI" userId="89c7df381375e6aa" providerId="LiveId" clId="{002FC19B-B750-46E5-AE6C-2EDFEC68FEF2}" dt="2023-12-09T11:37:27.128" v="4268" actId="20577"/>
+          <ac:chgData name="Matteo MANGILI" userId="89c7df381375e6aa" providerId="LiveId" clId="{002FC19B-B750-46E5-AE6C-2EDFEC68FEF2}" dt="2023-12-10T18:39:56.220" v="5034" actId="20577"/>
           <ac:spMkLst>
             <pc:docMk/>
             <pc:sldMk cId="2728347993" sldId="304"/>
@@ -1569,7 +1569,7 @@
         </pc:spChg>
       </pc:sldChg>
       <pc:sldChg chg="addSp delSp modSp add mod">
-        <pc:chgData name="Matteo MANGILI" userId="89c7df381375e6aa" providerId="LiveId" clId="{002FC19B-B750-46E5-AE6C-2EDFEC68FEF2}" dt="2023-12-02T20:35:48.435" v="1633" actId="14100"/>
+        <pc:chgData name="Matteo MANGILI" userId="89c7df381375e6aa" providerId="LiveId" clId="{002FC19B-B750-46E5-AE6C-2EDFEC68FEF2}" dt="2023-12-10T18:24:33.503" v="4365" actId="21"/>
         <pc:sldMkLst>
           <pc:docMk/>
           <pc:sldMk cId="4188911557" sldId="312"/>
@@ -1590,12 +1590,52 @@
             <ac:spMk id="4" creationId="{0B9BE06A-2A10-766E-30FB-68BA1AE33F20}"/>
           </ac:spMkLst>
         </pc:spChg>
+        <pc:spChg chg="add del mod">
+          <ac:chgData name="Matteo MANGILI" userId="89c7df381375e6aa" providerId="LiveId" clId="{002FC19B-B750-46E5-AE6C-2EDFEC68FEF2}" dt="2023-12-10T18:22:34.858" v="4312"/>
+          <ac:spMkLst>
+            <pc:docMk/>
+            <pc:sldMk cId="4188911557" sldId="312"/>
+            <ac:spMk id="4" creationId="{6923AA3D-9351-7294-10A1-289A71A46C96}"/>
+          </ac:spMkLst>
+        </pc:spChg>
         <pc:spChg chg="add del">
           <ac:chgData name="Matteo MANGILI" userId="89c7df381375e6aa" providerId="LiveId" clId="{002FC19B-B750-46E5-AE6C-2EDFEC68FEF2}" dt="2023-12-02T20:34:12.655" v="1537"/>
           <ac:spMkLst>
             <pc:docMk/>
             <pc:sldMk cId="4188911557" sldId="312"/>
             <ac:spMk id="5" creationId="{8FC71FAA-508C-ECF6-B514-FCD4713DBBF1}"/>
+          </ac:spMkLst>
+        </pc:spChg>
+        <pc:spChg chg="add mod">
+          <ac:chgData name="Matteo MANGILI" userId="89c7df381375e6aa" providerId="LiveId" clId="{002FC19B-B750-46E5-AE6C-2EDFEC68FEF2}" dt="2023-12-10T18:22:59.174" v="4328" actId="14100"/>
+          <ac:spMkLst>
+            <pc:docMk/>
+            <pc:sldMk cId="4188911557" sldId="312"/>
+            <ac:spMk id="5" creationId="{94653B8F-ADAC-D01C-5C88-2E369E0B3234}"/>
+          </ac:spMkLst>
+        </pc:spChg>
+        <pc:spChg chg="add mod">
+          <ac:chgData name="Matteo MANGILI" userId="89c7df381375e6aa" providerId="LiveId" clId="{002FC19B-B750-46E5-AE6C-2EDFEC68FEF2}" dt="2023-12-10T18:23:42.260" v="4345" actId="1076"/>
+          <ac:spMkLst>
+            <pc:docMk/>
+            <pc:sldMk cId="4188911557" sldId="312"/>
+            <ac:spMk id="8" creationId="{364845DF-E527-AE8E-132D-4C86AC60FCAB}"/>
+          </ac:spMkLst>
+        </pc:spChg>
+        <pc:spChg chg="add mod">
+          <ac:chgData name="Matteo MANGILI" userId="89c7df381375e6aa" providerId="LiveId" clId="{002FC19B-B750-46E5-AE6C-2EDFEC68FEF2}" dt="2023-12-10T18:24:29.566" v="4364" actId="6549"/>
+          <ac:spMkLst>
+            <pc:docMk/>
+            <pc:sldMk cId="4188911557" sldId="312"/>
+            <ac:spMk id="9" creationId="{DAA31704-DD1F-62C0-B9AA-B224EB28798B}"/>
+          </ac:spMkLst>
+        </pc:spChg>
+        <pc:spChg chg="add del">
+          <ac:chgData name="Matteo MANGILI" userId="89c7df381375e6aa" providerId="LiveId" clId="{002FC19B-B750-46E5-AE6C-2EDFEC68FEF2}" dt="2023-12-10T18:24:33.503" v="4365" actId="21"/>
+          <ac:spMkLst>
+            <pc:docMk/>
+            <pc:sldMk cId="4188911557" sldId="312"/>
+            <ac:spMk id="11" creationId="{04D23210-DAC7-2F2E-ECF7-0F861DF2CB46}"/>
           </ac:spMkLst>
         </pc:spChg>
         <pc:spChg chg="mod">
@@ -1607,7 +1647,7 @@
           </ac:spMkLst>
         </pc:spChg>
         <pc:picChg chg="add mod">
-          <ac:chgData name="Matteo MANGILI" userId="89c7df381375e6aa" providerId="LiveId" clId="{002FC19B-B750-46E5-AE6C-2EDFEC68FEF2}" dt="2023-12-02T20:34:37.445" v="1549" actId="14100"/>
+          <ac:chgData name="Matteo MANGILI" userId="89c7df381375e6aa" providerId="LiveId" clId="{002FC19B-B750-46E5-AE6C-2EDFEC68FEF2}" dt="2023-12-10T18:22:17.184" v="4307" actId="14100"/>
           <ac:picMkLst>
             <pc:docMk/>
             <pc:sldMk cId="4188911557" sldId="312"/>
@@ -1615,7 +1655,7 @@
           </ac:picMkLst>
         </pc:picChg>
         <pc:picChg chg="add mod">
-          <ac:chgData name="Matteo MANGILI" userId="89c7df381375e6aa" providerId="LiveId" clId="{002FC19B-B750-46E5-AE6C-2EDFEC68FEF2}" dt="2023-12-02T20:34:23.235" v="1540" actId="1076"/>
+          <ac:chgData name="Matteo MANGILI" userId="89c7df381375e6aa" providerId="LiveId" clId="{002FC19B-B750-46E5-AE6C-2EDFEC68FEF2}" dt="2023-12-10T18:22:13.902" v="4306" actId="1076"/>
           <ac:picMkLst>
             <pc:docMk/>
             <pc:sldMk cId="4188911557" sldId="312"/>
@@ -1623,7 +1663,7 @@
           </ac:picMkLst>
         </pc:picChg>
         <pc:picChg chg="add mod">
-          <ac:chgData name="Matteo MANGILI" userId="89c7df381375e6aa" providerId="LiveId" clId="{002FC19B-B750-46E5-AE6C-2EDFEC68FEF2}" dt="2023-12-02T20:35:48.435" v="1633" actId="14100"/>
+          <ac:chgData name="Matteo MANGILI" userId="89c7df381375e6aa" providerId="LiveId" clId="{002FC19B-B750-46E5-AE6C-2EDFEC68FEF2}" dt="2023-12-10T18:22:11.777" v="4305" actId="1076"/>
           <ac:picMkLst>
             <pc:docMk/>
             <pc:sldMk cId="4188911557" sldId="312"/>
@@ -1632,7 +1672,7 @@
         </pc:picChg>
       </pc:sldChg>
       <pc:sldChg chg="addSp delSp modSp new mod setBg">
-        <pc:chgData name="Matteo MANGILI" userId="89c7df381375e6aa" providerId="LiveId" clId="{002FC19B-B750-46E5-AE6C-2EDFEC68FEF2}" dt="2023-12-09T11:29:03.608" v="4033" actId="20577"/>
+        <pc:chgData name="Matteo MANGILI" userId="89c7df381375e6aa" providerId="LiveId" clId="{002FC19B-B750-46E5-AE6C-2EDFEC68FEF2}" dt="2023-12-10T18:37:06.421" v="4984" actId="20577"/>
         <pc:sldMkLst>
           <pc:docMk/>
           <pc:sldMk cId="3576197673" sldId="313"/>
@@ -1645,32 +1685,32 @@
             <ac:spMk id="2" creationId="{9C02EA9E-627C-1C35-F5DD-BAE1234B2C25}"/>
           </ac:spMkLst>
         </pc:spChg>
-        <pc:spChg chg="add">
-          <ac:chgData name="Matteo MANGILI" userId="89c7df381375e6aa" providerId="LiveId" clId="{002FC19B-B750-46E5-AE6C-2EDFEC68FEF2}" dt="2023-12-09T11:28:35.129" v="4015" actId="26606"/>
+        <pc:spChg chg="add del">
+          <ac:chgData name="Matteo MANGILI" userId="89c7df381375e6aa" providerId="LiveId" clId="{002FC19B-B750-46E5-AE6C-2EDFEC68FEF2}" dt="2023-12-10T18:27:51.805" v="4574" actId="3680"/>
           <ac:spMkLst>
             <pc:docMk/>
             <pc:sldMk cId="3576197673" sldId="313"/>
             <ac:spMk id="3" creationId="{F3C45A35-26CF-8F60-DA33-010A0B4D0549}"/>
           </ac:spMkLst>
         </pc:spChg>
-        <pc:spChg chg="add">
-          <ac:chgData name="Matteo MANGILI" userId="89c7df381375e6aa" providerId="LiveId" clId="{002FC19B-B750-46E5-AE6C-2EDFEC68FEF2}" dt="2023-12-09T11:28:35.129" v="4015" actId="26606"/>
+        <pc:spChg chg="add del mod">
+          <ac:chgData name="Matteo MANGILI" userId="89c7df381375e6aa" providerId="LiveId" clId="{002FC19B-B750-46E5-AE6C-2EDFEC68FEF2}" dt="2023-12-10T18:29:04.861" v="4586" actId="21"/>
           <ac:spMkLst>
             <pc:docMk/>
             <pc:sldMk cId="3576197673" sldId="313"/>
             <ac:spMk id="4" creationId="{AB6B19E2-3410-0DB2-0B4A-ED7B24C9CDE1}"/>
           </ac:spMkLst>
         </pc:spChg>
-        <pc:spChg chg="add">
-          <ac:chgData name="Matteo MANGILI" userId="89c7df381375e6aa" providerId="LiveId" clId="{002FC19B-B750-46E5-AE6C-2EDFEC68FEF2}" dt="2023-12-09T11:28:35.129" v="4015" actId="26606"/>
+        <pc:spChg chg="add del mod">
+          <ac:chgData name="Matteo MANGILI" userId="89c7df381375e6aa" providerId="LiveId" clId="{002FC19B-B750-46E5-AE6C-2EDFEC68FEF2}" dt="2023-12-10T18:29:27.822" v="4589" actId="21"/>
           <ac:spMkLst>
             <pc:docMk/>
             <pc:sldMk cId="3576197673" sldId="313"/>
             <ac:spMk id="5" creationId="{A2E5A269-6D28-FFBD-D2A8-5A1F47334F91}"/>
           </ac:spMkLst>
         </pc:spChg>
-        <pc:spChg chg="add">
-          <ac:chgData name="Matteo MANGILI" userId="89c7df381375e6aa" providerId="LiveId" clId="{002FC19B-B750-46E5-AE6C-2EDFEC68FEF2}" dt="2023-12-09T11:28:35.129" v="4015" actId="26606"/>
+        <pc:spChg chg="add mod">
+          <ac:chgData name="Matteo MANGILI" userId="89c7df381375e6aa" providerId="LiveId" clId="{002FC19B-B750-46E5-AE6C-2EDFEC68FEF2}" dt="2023-12-10T18:29:44.420" v="4592" actId="113"/>
           <ac:spMkLst>
             <pc:docMk/>
             <pc:sldMk cId="3576197673" sldId="313"/>
@@ -1733,6 +1773,14 @@
             <ac:spMk id="14" creationId="{37877047-568D-8624-9544-4628D5D5CD3D}"/>
           </ac:spMkLst>
         </pc:spChg>
+        <pc:graphicFrameChg chg="add mod ord modGraphic">
+          <ac:chgData name="Matteo MANGILI" userId="89c7df381375e6aa" providerId="LiveId" clId="{002FC19B-B750-46E5-AE6C-2EDFEC68FEF2}" dt="2023-12-10T18:37:06.421" v="4984" actId="20577"/>
+          <ac:graphicFrameMkLst>
+            <pc:docMk/>
+            <pc:sldMk cId="3576197673" sldId="313"/>
+            <ac:graphicFrameMk id="7" creationId="{27CC74FB-BD97-33CB-0677-7767F0959E2B}"/>
+          </ac:graphicFrameMkLst>
+        </pc:graphicFrameChg>
       </pc:sldChg>
     </pc:docChg>
   </pc:docChgLst>
@@ -1835,7 +1883,7 @@
             <a:pPr rtl="0"/>
             <a:fld id="{DBC54730-5EBA-4920-A6C4-7F8458A7F940}" type="datetime1">
               <a:rPr lang="it-IT" smtClean="0"/>
-              <a:t>09/12/2023</a:t>
+              <a:t>10/12/2023</a:t>
             </a:fld>
             <a:endParaRPr lang="it-IT"/>
           </a:p>
@@ -2017,7 +2065,7 @@
             <a:fld id="{85EC1C34-318D-43A8-83F5-3AC8647FE75E}" type="datetime1">
               <a:rPr lang="it-IT" smtClean="0"/>
               <a:pPr/>
-              <a:t>09/12/2023</a:t>
+              <a:t>10/12/2023</a:t>
             </a:fld>
             <a:endParaRPr lang="it-IT" dirty="0"/>
           </a:p>
@@ -16720,7 +16768,7 @@
         </p:spPr>
         <p:txBody>
           <a:bodyPr>
-            <a:normAutofit fontScale="92500" lnSpcReduction="20000"/>
+            <a:normAutofit fontScale="85000" lnSpcReduction="20000"/>
           </a:bodyPr>
           <a:lstStyle/>
           <a:p>
@@ -16870,9 +16918,10 @@
               <a:buChar char="Ø"/>
             </a:pPr>
             <a:r>
-              <a:rPr lang="en-US" sz="2200" dirty="0"/>
-              <a:t>Verbale Medico</a:t>
-            </a:r>
+              <a:rPr lang="en-US" sz="2200" dirty="0" err="1"/>
+              <a:t>Intervento</a:t>
+            </a:r>
+            <a:endParaRPr lang="en-US" sz="2200" dirty="0"/>
           </a:p>
           <a:p>
             <a:pPr>
@@ -16881,6 +16930,16 @@
             </a:pPr>
             <a:r>
               <a:rPr lang="en-US" sz="2200" dirty="0"/>
+              <a:t>Verbale Medico</a:t>
+            </a:r>
+          </a:p>
+          <a:p>
+            <a:pPr>
+              <a:buFont typeface="Wingdings" panose="05000000000000000000" pitchFamily="2" charset="2"/>
+              <a:buChar char="Ø"/>
+            </a:pPr>
+            <a:r>
+              <a:rPr lang="en-US" sz="2200" dirty="0"/>
               <a:t>Stampa</a:t>
             </a:r>
           </a:p>
@@ -16933,6 +16992,38 @@
             <a:r>
               <a:rPr lang="en-US" sz="2200" dirty="0" err="1"/>
               <a:t>liste</a:t>
+            </a:r>
+            <a:r>
+              <a:rPr lang="en-US" sz="2200" dirty="0"/>
+              <a:t> e </a:t>
+            </a:r>
+            <a:r>
+              <a:rPr lang="en-US" sz="2200" dirty="0" err="1"/>
+              <a:t>alla</a:t>
+            </a:r>
+            <a:r>
+              <a:rPr lang="en-US" sz="2200" dirty="0"/>
+              <a:t> </a:t>
+            </a:r>
+            <a:r>
+              <a:rPr lang="en-US" sz="2200" dirty="0" err="1"/>
+              <a:t>pagina</a:t>
+            </a:r>
+            <a:r>
+              <a:rPr lang="en-US" sz="2200" dirty="0"/>
+              <a:t> </a:t>
+            </a:r>
+            <a:r>
+              <a:rPr lang="en-US" sz="2200" dirty="0" err="1"/>
+              <a:t>anagrafica</a:t>
+            </a:r>
+            <a:r>
+              <a:rPr lang="en-US" sz="2200" dirty="0"/>
+              <a:t> del </a:t>
+            </a:r>
+            <a:r>
+              <a:rPr lang="en-US" sz="2200" dirty="0" err="1"/>
+              <a:t>paziente</a:t>
             </a:r>
             <a:r>
               <a:rPr lang="en-US" sz="2200" dirty="0"/>
@@ -21915,7 +22006,7 @@
             </a:r>
             <a:r>
               <a:rPr lang="en-US" sz="2200" dirty="0"/>
-              <a:t> </a:t>
+              <a:t>, </a:t>
             </a:r>
             <a:r>
               <a:rPr lang="en-US" sz="2200" dirty="0" err="1"/>
@@ -21927,6 +22018,22 @@
             </a:r>
             <a:r>
               <a:rPr lang="en-US" sz="2200" dirty="0" err="1"/>
+              <a:t>durante</a:t>
+            </a:r>
+            <a:r>
+              <a:rPr lang="en-US" sz="2200" dirty="0"/>
+              <a:t> la </a:t>
+            </a:r>
+            <a:r>
+              <a:rPr lang="en-US" sz="2200" dirty="0" err="1"/>
+              <a:t>stesura</a:t>
+            </a:r>
+            <a:r>
+              <a:rPr lang="en-US" sz="2200" dirty="0"/>
+              <a:t> del Progetto, </a:t>
+            </a:r>
+            <a:r>
+              <a:rPr lang="en-US" sz="2200" dirty="0" err="1"/>
               <a:t>sono</a:t>
             </a:r>
             <a:r>
@@ -22074,7 +22181,7 @@
             </a:r>
             <a:r>
               <a:rPr lang="en-US" sz="2200" dirty="0"/>
-              <a:t> di GitHub.</a:t>
+              <a:t> di GitHub</a:t>
             </a:r>
           </a:p>
         </p:txBody>
@@ -22935,7 +23042,7 @@
         <p:spPr>
           <a:xfrm>
             <a:off x="581899" y="1928061"/>
-            <a:ext cx="2833105" cy="2376000"/>
+            <a:ext cx="3355619" cy="2376000"/>
           </a:xfrm>
           <a:prstGeom prst="rect">
             <a:avLst/>
@@ -23010,7 +23117,7 @@
         </p:blipFill>
         <p:spPr>
           <a:xfrm>
-            <a:off x="3901782" y="2057360"/>
+            <a:off x="5105431" y="1985560"/>
             <a:ext cx="2438400" cy="2438400"/>
           </a:xfrm>
           <a:prstGeom prst="rect">
@@ -23040,7 +23147,7 @@
         </p:blipFill>
         <p:spPr>
           <a:xfrm>
-            <a:off x="7389845" y="2000061"/>
+            <a:off x="9017964" y="1892061"/>
             <a:ext cx="2448000" cy="2448000"/>
           </a:xfrm>
           <a:prstGeom prst="rect">
@@ -23048,6 +23155,113 @@
           </a:prstGeom>
         </p:spPr>
       </p:pic>
+      <p:sp>
+        <p:nvSpPr>
+          <p:cNvPr id="5" name="CasellaDiTesto 4">
+            <a:extLst>
+              <a:ext uri="{FF2B5EF4-FFF2-40B4-BE49-F238E27FC236}">
+                <a16:creationId xmlns:a16="http://schemas.microsoft.com/office/drawing/2014/main" id="{94653B8F-ADAC-D01C-5C88-2E369E0B3234}"/>
+              </a:ext>
+            </a:extLst>
+          </p:cNvPr>
+          <p:cNvSpPr txBox="1"/>
+          <p:nvPr/>
+        </p:nvSpPr>
+        <p:spPr>
+          <a:xfrm>
+            <a:off x="1595534" y="4811295"/>
+            <a:ext cx="1073021" cy="369332"/>
+          </a:xfrm>
+          <a:prstGeom prst="rect">
+            <a:avLst/>
+          </a:prstGeom>
+          <a:noFill/>
+        </p:spPr>
+        <p:txBody>
+          <a:bodyPr wrap="square" rtlCol="0">
+            <a:spAutoFit/>
+          </a:bodyPr>
+          <a:lstStyle/>
+          <a:p>
+            <a:r>
+              <a:rPr lang="it-IT" dirty="0" err="1"/>
+              <a:t>StarUML</a:t>
+            </a:r>
+            <a:endParaRPr lang="it-IT" dirty="0"/>
+          </a:p>
+        </p:txBody>
+      </p:sp>
+      <p:sp>
+        <p:nvSpPr>
+          <p:cNvPr id="8" name="CasellaDiTesto 7">
+            <a:extLst>
+              <a:ext uri="{FF2B5EF4-FFF2-40B4-BE49-F238E27FC236}">
+                <a16:creationId xmlns:a16="http://schemas.microsoft.com/office/drawing/2014/main" id="{364845DF-E527-AE8E-132D-4C86AC60FCAB}"/>
+              </a:ext>
+            </a:extLst>
+          </p:cNvPr>
+          <p:cNvSpPr txBox="1"/>
+          <p:nvPr/>
+        </p:nvSpPr>
+        <p:spPr>
+          <a:xfrm>
+            <a:off x="5592178" y="4811295"/>
+            <a:ext cx="1464906" cy="369332"/>
+          </a:xfrm>
+          <a:prstGeom prst="rect">
+            <a:avLst/>
+          </a:prstGeom>
+          <a:noFill/>
+        </p:spPr>
+        <p:txBody>
+          <a:bodyPr wrap="square" rtlCol="0">
+            <a:spAutoFit/>
+          </a:bodyPr>
+          <a:lstStyle/>
+          <a:p>
+            <a:r>
+              <a:rPr lang="it-IT" dirty="0"/>
+              <a:t>Eclipse IDE</a:t>
+            </a:r>
+          </a:p>
+        </p:txBody>
+      </p:sp>
+      <p:sp>
+        <p:nvSpPr>
+          <p:cNvPr id="9" name="CasellaDiTesto 8">
+            <a:extLst>
+              <a:ext uri="{FF2B5EF4-FFF2-40B4-BE49-F238E27FC236}">
+                <a16:creationId xmlns:a16="http://schemas.microsoft.com/office/drawing/2014/main" id="{DAA31704-DD1F-62C0-B9AA-B224EB28798B}"/>
+              </a:ext>
+            </a:extLst>
+          </p:cNvPr>
+          <p:cNvSpPr txBox="1"/>
+          <p:nvPr/>
+        </p:nvSpPr>
+        <p:spPr>
+          <a:xfrm>
+            <a:off x="9187776" y="4811295"/>
+            <a:ext cx="861293" cy="369332"/>
+          </a:xfrm>
+          <a:prstGeom prst="rect">
+            <a:avLst/>
+          </a:prstGeom>
+          <a:noFill/>
+        </p:spPr>
+        <p:txBody>
+          <a:bodyPr wrap="square" rtlCol="0">
+            <a:spAutoFit/>
+          </a:bodyPr>
+          <a:lstStyle/>
+          <a:p>
+            <a:r>
+              <a:rPr lang="it-IT"/>
+              <a:t>GitHub</a:t>
+            </a:r>
+            <a:endParaRPr lang="it-IT" dirty="0"/>
+          </a:p>
+        </p:txBody>
+      </p:sp>
     </p:spTree>
     <p:extLst>
       <p:ext uri="{BB962C8B-B14F-4D97-AF65-F5344CB8AC3E}">
@@ -23847,7 +24061,7 @@
         <p:spPr>
           <a:xfrm>
             <a:off x="838200" y="1929384"/>
-            <a:ext cx="10515600" cy="4038865"/>
+            <a:ext cx="10515600" cy="4563491"/>
           </a:xfrm>
         </p:spPr>
         <p:txBody>
@@ -23925,6 +24139,42 @@
               <a:rPr lang="it-IT" sz="2200" dirty="0"/>
               <a:t> corrispondenti</a:t>
             </a:r>
+          </a:p>
+          <a:p>
+            <a:pPr marL="0" indent="0">
+              <a:buNone/>
+            </a:pPr>
+            <a:endParaRPr lang="it-IT" sz="2200" dirty="0"/>
+          </a:p>
+          <a:p>
+            <a:pPr marL="0" indent="0">
+              <a:buNone/>
+            </a:pPr>
+            <a:r>
+              <a:rPr lang="it-IT" sz="2200" b="1" dirty="0"/>
+              <a:t>PULL REQUEST </a:t>
+            </a:r>
+            <a:r>
+              <a:rPr lang="it-IT" sz="2200" dirty="0"/>
+              <a:t>Per</a:t>
+            </a:r>
+            <a:r>
+              <a:rPr lang="it-IT" sz="2200" b="1" dirty="0"/>
+              <a:t> </a:t>
+            </a:r>
+            <a:r>
+              <a:rPr lang="it-IT" sz="2200" dirty="0"/>
+              <a:t>le modifiche importanti o azioni di merge, sono state create delle pull </a:t>
+            </a:r>
+            <a:r>
+              <a:rPr lang="it-IT" sz="2200" dirty="0" err="1"/>
+              <a:t>request</a:t>
+            </a:r>
+            <a:r>
+              <a:rPr lang="it-IT" sz="2200" dirty="0"/>
+              <a:t>, le quali venivano approvate da tutti i membri del team</a:t>
+            </a:r>
+            <a:endParaRPr lang="it-IT" sz="2200" b="1" dirty="0"/>
           </a:p>
           <a:p>
             <a:pPr marL="0" indent="0">
@@ -26892,118 +27142,544 @@
           </a:p>
         </p:txBody>
       </p:sp>
-      <p:sp>
-        <p:nvSpPr>
-          <p:cNvPr id="3" name="Segnaposto contenuto 2">
+      <p:graphicFrame>
+        <p:nvGraphicFramePr>
+          <p:cNvPr id="7" name="Segnaposto contenuto 6">
             <a:extLst>
               <a:ext uri="{FF2B5EF4-FFF2-40B4-BE49-F238E27FC236}">
-                <a16:creationId xmlns:a16="http://schemas.microsoft.com/office/drawing/2014/main" id="{F3C45A35-26CF-8F60-DA33-010A0B4D0549}"/>
+                <a16:creationId xmlns:a16="http://schemas.microsoft.com/office/drawing/2014/main" id="{27CC74FB-BD97-33CB-0677-7767F0959E2B}"/>
               </a:ext>
             </a:extLst>
           </p:cNvPr>
-          <p:cNvSpPr>
-            <a:spLocks noGrp="1"/>
-          </p:cNvSpPr>
+          <p:cNvGraphicFramePr>
+            <a:graphicFrameLocks noGrp="1"/>
+          </p:cNvGraphicFramePr>
           <p:nvPr>
             <p:ph idx="1"/>
+            <p:extLst>
+              <p:ext uri="{D42A27DB-BD31-4B8C-83A1-F6EECF244321}">
+                <p14:modId xmlns:p14="http://schemas.microsoft.com/office/powerpoint/2010/main" val="3478751295"/>
+              </p:ext>
+            </p:extLst>
           </p:nvPr>
-        </p:nvSpPr>
-        <p:spPr>
-          <a:xfrm>
-            <a:off x="838200" y="1929384"/>
-            <a:ext cx="10515600" cy="4251960"/>
-          </a:xfrm>
-        </p:spPr>
-        <p:txBody>
-          <a:bodyPr>
-            <a:normAutofit/>
-          </a:bodyPr>
-          <a:lstStyle/>
-          <a:p>
-            <a:endParaRPr lang="it-IT" sz="2200" dirty="0"/>
-          </a:p>
-        </p:txBody>
-      </p:sp>
-      <p:sp>
-        <p:nvSpPr>
-          <p:cNvPr id="4" name="Segnaposto data 3">
-            <a:extLst>
-              <a:ext uri="{FF2B5EF4-FFF2-40B4-BE49-F238E27FC236}">
-                <a16:creationId xmlns:a16="http://schemas.microsoft.com/office/drawing/2014/main" id="{AB6B19E2-3410-0DB2-0B4A-ED7B24C9CDE1}"/>
-              </a:ext>
-            </a:extLst>
-          </p:cNvPr>
-          <p:cNvSpPr>
-            <a:spLocks noGrp="1"/>
-          </p:cNvSpPr>
-          <p:nvPr>
-            <p:ph type="dt" sz="half" idx="10"/>
-          </p:nvPr>
-        </p:nvSpPr>
-        <p:spPr>
-          <a:xfrm>
-            <a:off x="838200" y="6356350"/>
-            <a:ext cx="2743200" cy="365125"/>
-          </a:xfrm>
-        </p:spPr>
-        <p:txBody>
-          <a:bodyPr>
-            <a:normAutofit/>
-          </a:bodyPr>
-          <a:lstStyle/>
-          <a:p>
-            <a:pPr rtl="0">
-              <a:spcAft>
-                <a:spcPts val="600"/>
-              </a:spcAft>
-            </a:pPr>
-            <a:r>
-              <a:rPr lang="it-IT" noProof="0"/>
-              <a:t>20XX</a:t>
-            </a:r>
-          </a:p>
-        </p:txBody>
-      </p:sp>
-      <p:sp>
-        <p:nvSpPr>
-          <p:cNvPr id="5" name="Segnaposto piè di pagina 4">
-            <a:extLst>
-              <a:ext uri="{FF2B5EF4-FFF2-40B4-BE49-F238E27FC236}">
-                <a16:creationId xmlns:a16="http://schemas.microsoft.com/office/drawing/2014/main" id="{A2E5A269-6D28-FFBD-D2A8-5A1F47334F91}"/>
-              </a:ext>
-            </a:extLst>
-          </p:cNvPr>
-          <p:cNvSpPr>
-            <a:spLocks noGrp="1"/>
-          </p:cNvSpPr>
-          <p:nvPr>
-            <p:ph type="ftr" sz="quarter" idx="11"/>
-          </p:nvPr>
-        </p:nvSpPr>
-        <p:spPr>
-          <a:xfrm>
-            <a:off x="4038600" y="6356350"/>
-            <a:ext cx="4114800" cy="365125"/>
-          </a:xfrm>
-        </p:spPr>
-        <p:txBody>
-          <a:bodyPr>
-            <a:normAutofit/>
-          </a:bodyPr>
-          <a:lstStyle/>
-          <a:p>
-            <a:pPr rtl="0">
-              <a:spcAft>
-                <a:spcPts val="600"/>
-              </a:spcAft>
-            </a:pPr>
-            <a:r>
-              <a:rPr lang="it-IT" noProof="0"/>
-              <a:t>Presentazione</a:t>
-            </a:r>
-          </a:p>
-        </p:txBody>
-      </p:sp>
+        </p:nvGraphicFramePr>
+        <p:xfrm>
+          <a:off x="838200" y="1825625"/>
+          <a:ext cx="10515600" cy="4271996"/>
+        </p:xfrm>
+        <a:graphic>
+          <a:graphicData uri="http://schemas.openxmlformats.org/drawingml/2006/table">
+            <a:tbl>
+              <a:tblPr>
+                <a:tableStyleId>{073A0DAA-6AF3-43AB-8588-CEC1D06C72B9}</a:tableStyleId>
+              </a:tblPr>
+              <a:tblGrid>
+                <a:gridCol w="5257800">
+                  <a:extLst>
+                    <a:ext uri="{9D8B030D-6E8A-4147-A177-3AD203B41FA5}">
+                      <a16:colId xmlns:a16="http://schemas.microsoft.com/office/drawing/2014/main" val="999764677"/>
+                    </a:ext>
+                  </a:extLst>
+                </a:gridCol>
+                <a:gridCol w="5257800">
+                  <a:extLst>
+                    <a:ext uri="{9D8B030D-6E8A-4147-A177-3AD203B41FA5}">
+                      <a16:colId xmlns:a16="http://schemas.microsoft.com/office/drawing/2014/main" val="942508042"/>
+                    </a:ext>
+                  </a:extLst>
+                </a:gridCol>
+              </a:tblGrid>
+              <a:tr h="1067999">
+                <a:tc>
+                  <a:txBody>
+                    <a:bodyPr/>
+                    <a:lstStyle/>
+                    <a:p>
+                      <a:pPr algn="ctr">
+                        <a:lnSpc>
+                          <a:spcPct val="250000"/>
+                        </a:lnSpc>
+                      </a:pPr>
+                      <a:r>
+                        <a:rPr lang="it-IT" sz="2000" b="1" dirty="0"/>
+                        <a:t>MUST HAVE</a:t>
+                      </a:r>
+                    </a:p>
+                  </a:txBody>
+                  <a:tcPr>
+                    <a:lnL w="12700" cap="flat" cmpd="sng" algn="ctr">
+                      <a:solidFill>
+                        <a:schemeClr val="tx1"/>
+                      </a:solidFill>
+                      <a:prstDash val="solid"/>
+                      <a:round/>
+                      <a:headEnd type="none" w="med" len="med"/>
+                      <a:tailEnd type="none" w="med" len="med"/>
+                    </a:lnL>
+                    <a:lnR w="12700" cap="flat" cmpd="sng" algn="ctr">
+                      <a:solidFill>
+                        <a:schemeClr val="tx1"/>
+                      </a:solidFill>
+                      <a:prstDash val="solid"/>
+                      <a:round/>
+                      <a:headEnd type="none" w="med" len="med"/>
+                      <a:tailEnd type="none" w="med" len="med"/>
+                    </a:lnR>
+                    <a:lnT w="12700" cap="flat" cmpd="sng" algn="ctr">
+                      <a:solidFill>
+                        <a:schemeClr val="tx1"/>
+                      </a:solidFill>
+                      <a:prstDash val="solid"/>
+                      <a:round/>
+                      <a:headEnd type="none" w="med" len="med"/>
+                      <a:tailEnd type="none" w="med" len="med"/>
+                    </a:lnT>
+                    <a:lnB w="12700" cap="flat" cmpd="sng" algn="ctr">
+                      <a:solidFill>
+                        <a:schemeClr val="tx1"/>
+                      </a:solidFill>
+                      <a:prstDash val="solid"/>
+                      <a:round/>
+                      <a:headEnd type="none" w="med" len="med"/>
+                      <a:tailEnd type="none" w="med" len="med"/>
+                    </a:lnB>
+                  </a:tcPr>
+                </a:tc>
+                <a:tc>
+                  <a:txBody>
+                    <a:bodyPr/>
+                    <a:lstStyle/>
+                    <a:p>
+                      <a:pPr marL="171450" indent="-171450">
+                        <a:buFont typeface="Arial" panose="020B0604020202020204" pitchFamily="34" charset="0"/>
+                        <a:buChar char="•"/>
+                      </a:pPr>
+                      <a:r>
+                        <a:rPr lang="it-IT" sz="1600" dirty="0"/>
+                        <a:t>Registrazione nel sistema</a:t>
+                      </a:r>
+                    </a:p>
+                    <a:p>
+                      <a:pPr marL="171450" indent="-171450">
+                        <a:buFont typeface="Arial" panose="020B0604020202020204" pitchFamily="34" charset="0"/>
+                        <a:buChar char="•"/>
+                      </a:pPr>
+                      <a:r>
+                        <a:rPr lang="it-IT" sz="1600" dirty="0"/>
+                        <a:t>Effettuare Esami corrispondenti</a:t>
+                      </a:r>
+                    </a:p>
+                    <a:p>
+                      <a:pPr marL="171450" indent="-171450">
+                        <a:buFont typeface="Arial" panose="020B0604020202020204" pitchFamily="34" charset="0"/>
+                        <a:buChar char="•"/>
+                      </a:pPr>
+                      <a:r>
+                        <a:rPr lang="it-IT" sz="1600" dirty="0"/>
+                        <a:t>Gestione pagina anagrafica paziente</a:t>
+                      </a:r>
+                    </a:p>
+                  </a:txBody>
+                  <a:tcPr>
+                    <a:lnL w="12700" cap="flat" cmpd="sng" algn="ctr">
+                      <a:solidFill>
+                        <a:schemeClr val="tx1"/>
+                      </a:solidFill>
+                      <a:prstDash val="solid"/>
+                      <a:round/>
+                      <a:headEnd type="none" w="med" len="med"/>
+                      <a:tailEnd type="none" w="med" len="med"/>
+                    </a:lnL>
+                    <a:lnR w="12700" cap="flat" cmpd="sng" algn="ctr">
+                      <a:solidFill>
+                        <a:schemeClr val="tx1"/>
+                      </a:solidFill>
+                      <a:prstDash val="solid"/>
+                      <a:round/>
+                      <a:headEnd type="none" w="med" len="med"/>
+                      <a:tailEnd type="none" w="med" len="med"/>
+                    </a:lnR>
+                    <a:lnT w="12700" cap="flat" cmpd="sng" algn="ctr">
+                      <a:solidFill>
+                        <a:schemeClr val="tx1"/>
+                      </a:solidFill>
+                      <a:prstDash val="solid"/>
+                      <a:round/>
+                      <a:headEnd type="none" w="med" len="med"/>
+                      <a:tailEnd type="none" w="med" len="med"/>
+                    </a:lnT>
+                    <a:lnB w="12700" cap="flat" cmpd="sng" algn="ctr">
+                      <a:solidFill>
+                        <a:schemeClr val="tx1"/>
+                      </a:solidFill>
+                      <a:prstDash val="solid"/>
+                      <a:round/>
+                      <a:headEnd type="none" w="med" len="med"/>
+                      <a:tailEnd type="none" w="med" len="med"/>
+                    </a:lnB>
+                  </a:tcPr>
+                </a:tc>
+                <a:extLst>
+                  <a:ext uri="{0D108BD9-81ED-4DB2-BD59-A6C34878D82A}">
+                    <a16:rowId xmlns:a16="http://schemas.microsoft.com/office/drawing/2014/main" val="938852911"/>
+                  </a:ext>
+                </a:extLst>
+              </a:tr>
+              <a:tr h="1067999">
+                <a:tc>
+                  <a:txBody>
+                    <a:bodyPr/>
+                    <a:lstStyle/>
+                    <a:p>
+                      <a:pPr algn="ctr">
+                        <a:lnSpc>
+                          <a:spcPct val="250000"/>
+                        </a:lnSpc>
+                      </a:pPr>
+                      <a:r>
+                        <a:rPr lang="it-IT" b="1" dirty="0"/>
+                        <a:t>SHOULD HAVE</a:t>
+                      </a:r>
+                    </a:p>
+                  </a:txBody>
+                  <a:tcPr>
+                    <a:lnL w="12700" cap="flat" cmpd="sng" algn="ctr">
+                      <a:solidFill>
+                        <a:schemeClr val="tx1"/>
+                      </a:solidFill>
+                      <a:prstDash val="solid"/>
+                      <a:round/>
+                      <a:headEnd type="none" w="med" len="med"/>
+                      <a:tailEnd type="none" w="med" len="med"/>
+                    </a:lnL>
+                    <a:lnR w="12700" cap="flat" cmpd="sng" algn="ctr">
+                      <a:solidFill>
+                        <a:schemeClr val="tx1"/>
+                      </a:solidFill>
+                      <a:prstDash val="solid"/>
+                      <a:round/>
+                      <a:headEnd type="none" w="med" len="med"/>
+                      <a:tailEnd type="none" w="med" len="med"/>
+                    </a:lnR>
+                    <a:lnT w="12700" cap="flat" cmpd="sng" algn="ctr">
+                      <a:solidFill>
+                        <a:schemeClr val="tx1"/>
+                      </a:solidFill>
+                      <a:prstDash val="solid"/>
+                      <a:round/>
+                      <a:headEnd type="none" w="med" len="med"/>
+                      <a:tailEnd type="none" w="med" len="med"/>
+                    </a:lnT>
+                    <a:lnB w="12700" cap="flat" cmpd="sng" algn="ctr">
+                      <a:solidFill>
+                        <a:schemeClr val="tx1"/>
+                      </a:solidFill>
+                      <a:prstDash val="solid"/>
+                      <a:round/>
+                      <a:headEnd type="none" w="med" len="med"/>
+                      <a:tailEnd type="none" w="med" len="med"/>
+                    </a:lnB>
+                  </a:tcPr>
+                </a:tc>
+                <a:tc>
+                  <a:txBody>
+                    <a:bodyPr/>
+                    <a:lstStyle/>
+                    <a:p>
+                      <a:pPr marL="285750" indent="-285750">
+                        <a:buFont typeface="Arial" panose="020B0604020202020204" pitchFamily="34" charset="0"/>
+                        <a:buChar char="•"/>
+                      </a:pPr>
+                      <a:r>
+                        <a:rPr lang="it-IT" sz="1600" dirty="0"/>
+                        <a:t>Iscrizione Lista Graduatoria</a:t>
+                      </a:r>
+                    </a:p>
+                    <a:p>
+                      <a:pPr marL="285750" indent="-285750">
+                        <a:buFont typeface="Arial" panose="020B0604020202020204" pitchFamily="34" charset="0"/>
+                        <a:buChar char="•"/>
+                      </a:pPr>
+                      <a:r>
+                        <a:rPr lang="it-IT" sz="1600" dirty="0"/>
+                        <a:t>Iscrizione Lista Operatoria Intervento specifico</a:t>
+                      </a:r>
+                    </a:p>
+                  </a:txBody>
+                  <a:tcPr>
+                    <a:lnL w="12700" cap="flat" cmpd="sng" algn="ctr">
+                      <a:solidFill>
+                        <a:schemeClr val="tx1"/>
+                      </a:solidFill>
+                      <a:prstDash val="solid"/>
+                      <a:round/>
+                      <a:headEnd type="none" w="med" len="med"/>
+                      <a:tailEnd type="none" w="med" len="med"/>
+                    </a:lnL>
+                    <a:lnR w="12700" cap="flat" cmpd="sng" algn="ctr">
+                      <a:solidFill>
+                        <a:schemeClr val="tx1"/>
+                      </a:solidFill>
+                      <a:prstDash val="solid"/>
+                      <a:round/>
+                      <a:headEnd type="none" w="med" len="med"/>
+                      <a:tailEnd type="none" w="med" len="med"/>
+                    </a:lnR>
+                    <a:lnT w="12700" cap="flat" cmpd="sng" algn="ctr">
+                      <a:solidFill>
+                        <a:schemeClr val="tx1"/>
+                      </a:solidFill>
+                      <a:prstDash val="solid"/>
+                      <a:round/>
+                      <a:headEnd type="none" w="med" len="med"/>
+                      <a:tailEnd type="none" w="med" len="med"/>
+                    </a:lnT>
+                    <a:lnB w="12700" cap="flat" cmpd="sng" algn="ctr">
+                      <a:solidFill>
+                        <a:schemeClr val="tx1"/>
+                      </a:solidFill>
+                      <a:prstDash val="solid"/>
+                      <a:round/>
+                      <a:headEnd type="none" w="med" len="med"/>
+                      <a:tailEnd type="none" w="med" len="med"/>
+                    </a:lnB>
+                  </a:tcPr>
+                </a:tc>
+                <a:extLst>
+                  <a:ext uri="{0D108BD9-81ED-4DB2-BD59-A6C34878D82A}">
+                    <a16:rowId xmlns:a16="http://schemas.microsoft.com/office/drawing/2014/main" val="3315907752"/>
+                  </a:ext>
+                </a:extLst>
+              </a:tr>
+              <a:tr h="1067999">
+                <a:tc>
+                  <a:txBody>
+                    <a:bodyPr/>
+                    <a:lstStyle/>
+                    <a:p>
+                      <a:pPr algn="ctr">
+                        <a:lnSpc>
+                          <a:spcPct val="250000"/>
+                        </a:lnSpc>
+                      </a:pPr>
+                      <a:r>
+                        <a:rPr lang="it-IT" b="1" dirty="0"/>
+                        <a:t>COULD HAVE</a:t>
+                      </a:r>
+                    </a:p>
+                  </a:txBody>
+                  <a:tcPr>
+                    <a:lnL w="12700" cap="flat" cmpd="sng" algn="ctr">
+                      <a:solidFill>
+                        <a:schemeClr val="tx1"/>
+                      </a:solidFill>
+                      <a:prstDash val="solid"/>
+                      <a:round/>
+                      <a:headEnd type="none" w="med" len="med"/>
+                      <a:tailEnd type="none" w="med" len="med"/>
+                    </a:lnL>
+                    <a:lnR w="12700" cap="flat" cmpd="sng" algn="ctr">
+                      <a:solidFill>
+                        <a:schemeClr val="tx1"/>
+                      </a:solidFill>
+                      <a:prstDash val="solid"/>
+                      <a:round/>
+                      <a:headEnd type="none" w="med" len="med"/>
+                      <a:tailEnd type="none" w="med" len="med"/>
+                    </a:lnR>
+                    <a:lnT w="12700" cap="flat" cmpd="sng" algn="ctr">
+                      <a:solidFill>
+                        <a:schemeClr val="tx1"/>
+                      </a:solidFill>
+                      <a:prstDash val="solid"/>
+                      <a:round/>
+                      <a:headEnd type="none" w="med" len="med"/>
+                      <a:tailEnd type="none" w="med" len="med"/>
+                    </a:lnT>
+                    <a:lnB w="12700" cap="flat" cmpd="sng" algn="ctr">
+                      <a:solidFill>
+                        <a:schemeClr val="tx1"/>
+                      </a:solidFill>
+                      <a:prstDash val="solid"/>
+                      <a:round/>
+                      <a:headEnd type="none" w="med" len="med"/>
+                      <a:tailEnd type="none" w="med" len="med"/>
+                    </a:lnB>
+                  </a:tcPr>
+                </a:tc>
+                <a:tc>
+                  <a:txBody>
+                    <a:bodyPr/>
+                    <a:lstStyle/>
+                    <a:p>
+                      <a:pPr marL="285750" indent="-285750">
+                        <a:buFont typeface="Arial" panose="020B0604020202020204" pitchFamily="34" charset="0"/>
+                        <a:buChar char="•"/>
+                      </a:pPr>
+                      <a:r>
+                        <a:rPr lang="it-IT" sz="1600" dirty="0"/>
+                        <a:t>Analisi Rischio sanitario</a:t>
+                      </a:r>
+                    </a:p>
+                  </a:txBody>
+                  <a:tcPr>
+                    <a:lnL w="12700" cap="flat" cmpd="sng" algn="ctr">
+                      <a:solidFill>
+                        <a:schemeClr val="tx1"/>
+                      </a:solidFill>
+                      <a:prstDash val="solid"/>
+                      <a:round/>
+                      <a:headEnd type="none" w="med" len="med"/>
+                      <a:tailEnd type="none" w="med" len="med"/>
+                    </a:lnL>
+                    <a:lnR w="12700" cap="flat" cmpd="sng" algn="ctr">
+                      <a:solidFill>
+                        <a:schemeClr val="tx1"/>
+                      </a:solidFill>
+                      <a:prstDash val="solid"/>
+                      <a:round/>
+                      <a:headEnd type="none" w="med" len="med"/>
+                      <a:tailEnd type="none" w="med" len="med"/>
+                    </a:lnR>
+                    <a:lnT w="12700" cap="flat" cmpd="sng" algn="ctr">
+                      <a:solidFill>
+                        <a:schemeClr val="tx1"/>
+                      </a:solidFill>
+                      <a:prstDash val="solid"/>
+                      <a:round/>
+                      <a:headEnd type="none" w="med" len="med"/>
+                      <a:tailEnd type="none" w="med" len="med"/>
+                    </a:lnT>
+                    <a:lnB w="12700" cap="flat" cmpd="sng" algn="ctr">
+                      <a:solidFill>
+                        <a:schemeClr val="tx1"/>
+                      </a:solidFill>
+                      <a:prstDash val="solid"/>
+                      <a:round/>
+                      <a:headEnd type="none" w="med" len="med"/>
+                      <a:tailEnd type="none" w="med" len="med"/>
+                    </a:lnB>
+                  </a:tcPr>
+                </a:tc>
+                <a:extLst>
+                  <a:ext uri="{0D108BD9-81ED-4DB2-BD59-A6C34878D82A}">
+                    <a16:rowId xmlns:a16="http://schemas.microsoft.com/office/drawing/2014/main" val="4059381850"/>
+                  </a:ext>
+                </a:extLst>
+              </a:tr>
+              <a:tr h="1067999">
+                <a:tc>
+                  <a:txBody>
+                    <a:bodyPr/>
+                    <a:lstStyle/>
+                    <a:p>
+                      <a:pPr algn="ctr">
+                        <a:lnSpc>
+                          <a:spcPct val="250000"/>
+                        </a:lnSpc>
+                      </a:pPr>
+                      <a:r>
+                        <a:rPr lang="it-IT" b="1" dirty="0"/>
+                        <a:t>WON’T HAVE</a:t>
+                      </a:r>
+                    </a:p>
+                  </a:txBody>
+                  <a:tcPr>
+                    <a:lnL w="12700" cap="flat" cmpd="sng" algn="ctr">
+                      <a:solidFill>
+                        <a:schemeClr val="tx1"/>
+                      </a:solidFill>
+                      <a:prstDash val="solid"/>
+                      <a:round/>
+                      <a:headEnd type="none" w="med" len="med"/>
+                      <a:tailEnd type="none" w="med" len="med"/>
+                    </a:lnL>
+                    <a:lnR w="12700" cap="flat" cmpd="sng" algn="ctr">
+                      <a:solidFill>
+                        <a:schemeClr val="tx1"/>
+                      </a:solidFill>
+                      <a:prstDash val="solid"/>
+                      <a:round/>
+                      <a:headEnd type="none" w="med" len="med"/>
+                      <a:tailEnd type="none" w="med" len="med"/>
+                    </a:lnR>
+                    <a:lnT w="12700" cap="flat" cmpd="sng" algn="ctr">
+                      <a:solidFill>
+                        <a:schemeClr val="tx1"/>
+                      </a:solidFill>
+                      <a:prstDash val="solid"/>
+                      <a:round/>
+                      <a:headEnd type="none" w="med" len="med"/>
+                      <a:tailEnd type="none" w="med" len="med"/>
+                    </a:lnT>
+                    <a:lnB w="12700" cap="flat" cmpd="sng" algn="ctr">
+                      <a:solidFill>
+                        <a:schemeClr val="tx1"/>
+                      </a:solidFill>
+                      <a:prstDash val="solid"/>
+                      <a:round/>
+                      <a:headEnd type="none" w="med" len="med"/>
+                      <a:tailEnd type="none" w="med" len="med"/>
+                    </a:lnB>
+                  </a:tcPr>
+                </a:tc>
+                <a:tc>
+                  <a:txBody>
+                    <a:bodyPr/>
+                    <a:lstStyle/>
+                    <a:p>
+                      <a:endParaRPr lang="it-IT" dirty="0"/>
+                    </a:p>
+                  </a:txBody>
+                  <a:tcPr>
+                    <a:lnL w="12700" cap="flat" cmpd="sng" algn="ctr">
+                      <a:solidFill>
+                        <a:schemeClr val="tx1"/>
+                      </a:solidFill>
+                      <a:prstDash val="solid"/>
+                      <a:round/>
+                      <a:headEnd type="none" w="med" len="med"/>
+                      <a:tailEnd type="none" w="med" len="med"/>
+                    </a:lnL>
+                    <a:lnR w="12700" cap="flat" cmpd="sng" algn="ctr">
+                      <a:solidFill>
+                        <a:schemeClr val="tx1"/>
+                      </a:solidFill>
+                      <a:prstDash val="solid"/>
+                      <a:round/>
+                      <a:headEnd type="none" w="med" len="med"/>
+                      <a:tailEnd type="none" w="med" len="med"/>
+                    </a:lnR>
+                    <a:lnT w="12700" cap="flat" cmpd="sng" algn="ctr">
+                      <a:solidFill>
+                        <a:schemeClr val="tx1"/>
+                      </a:solidFill>
+                      <a:prstDash val="solid"/>
+                      <a:round/>
+                      <a:headEnd type="none" w="med" len="med"/>
+                      <a:tailEnd type="none" w="med" len="med"/>
+                    </a:lnT>
+                    <a:lnB w="12700" cap="flat" cmpd="sng" algn="ctr">
+                      <a:solidFill>
+                        <a:schemeClr val="tx1"/>
+                      </a:solidFill>
+                      <a:prstDash val="solid"/>
+                      <a:round/>
+                      <a:headEnd type="none" w="med" len="med"/>
+                      <a:tailEnd type="none" w="med" len="med"/>
+                    </a:lnB>
+                  </a:tcPr>
+                </a:tc>
+                <a:extLst>
+                  <a:ext uri="{0D108BD9-81ED-4DB2-BD59-A6C34878D82A}">
+                    <a16:rowId xmlns:a16="http://schemas.microsoft.com/office/drawing/2014/main" val="3522210190"/>
+                  </a:ext>
+                </a:extLst>
+              </a:tr>
+            </a:tbl>
+          </a:graphicData>
+        </a:graphic>
+      </p:graphicFrame>
       <p:sp>
         <p:nvSpPr>
           <p:cNvPr id="6" name="Segnaposto numero diapositiva 5">
@@ -27022,8 +27698,8 @@
         </p:nvSpPr>
         <p:spPr>
           <a:xfrm>
-            <a:off x="8610600" y="6356350"/>
-            <a:ext cx="2743200" cy="365125"/>
+            <a:off x="8610600" y="6120882"/>
+            <a:ext cx="2743200" cy="600593"/>
           </a:xfrm>
         </p:spPr>
         <p:txBody>
@@ -27038,7 +27714,7 @@
               </a:spcAft>
             </a:pPr>
             <a:fld id="{B5CEABB6-07DC-46E8-9B57-56EC44A396E5}" type="slidenum">
-              <a:rPr lang="it-IT" noProof="0" smtClean="0"/>
+              <a:rPr lang="it-IT" sz="1800" b="1" noProof="0" smtClean="0"/>
               <a:pPr rtl="0">
                 <a:spcAft>
                   <a:spcPts val="600"/>
@@ -27046,7 +27722,7 @@
               </a:pPr>
               <a:t>8</a:t>
             </a:fld>
-            <a:endParaRPr lang="it-IT" noProof="0"/>
+            <a:endParaRPr lang="it-IT" sz="1800" b="1" noProof="0"/>
           </a:p>
         </p:txBody>
       </p:sp>
@@ -28907,6 +29583,15 @@
 </file>
 
 <file path=customXml/item1.xml><?xml version="1.0" encoding="utf-8"?>
+<?mso-contentType ?>
+<FormTemplates xmlns="http://schemas.microsoft.com/sharepoint/v3/contenttype/forms">
+  <Display>DocumentLibraryForm</Display>
+  <Edit>DocumentLibraryForm</Edit>
+  <New>DocumentLibraryForm</New>
+</FormTemplates>
+</file>
+
+<file path=customXml/item2.xml><?xml version="1.0" encoding="utf-8"?>
 <ct:contentTypeSchema xmlns:ct="http://schemas.microsoft.com/office/2006/metadata/contentType" xmlns:ma="http://schemas.microsoft.com/office/2006/metadata/properties/metaAttributes" ct:_="" ma:_="" ma:contentTypeName="Documento" ma:contentTypeID="0x0101007CE6213B20D2F945B0D1473923EE410F" ma:contentTypeVersion="7" ma:contentTypeDescription="Creare un nuovo documento." ma:contentTypeScope="" ma:versionID="dc8ac43e96b461727accd63cf925a5cf">
   <xsd:schema xmlns:xsd="http://www.w3.org/2001/XMLSchema" xmlns:xs="http://www.w3.org/2001/XMLSchema" xmlns:p="http://schemas.microsoft.com/office/2006/metadata/properties" xmlns:ns2="243f3390-b919-40e8-8195-3613e8527352" targetNamespace="http://schemas.microsoft.com/office/2006/metadata/properties" ma:root="true" ma:fieldsID="1987007e621e1b24d40e437f012b913d" ns2:_="">
     <xsd:import namespace="243f3390-b919-40e8-8195-3613e8527352"/>
@@ -29068,15 +29753,6 @@
 </ct:contentTypeSchema>
 </file>
 
-<file path=customXml/item2.xml><?xml version="1.0" encoding="utf-8"?>
-<?mso-contentType ?>
-<FormTemplates xmlns="http://schemas.microsoft.com/sharepoint/v3/contenttype/forms">
-  <Display>DocumentLibraryForm</Display>
-  <Edit>DocumentLibraryForm</Edit>
-  <New>DocumentLibraryForm</New>
-</FormTemplates>
-</file>
-
 <file path=customXml/item3.xml><?xml version="1.0" encoding="utf-8"?>
 <p:properties xmlns:p="http://schemas.microsoft.com/office/2006/metadata/properties" xmlns:xsi="http://www.w3.org/2001/XMLSchema-instance" xmlns:pc="http://schemas.microsoft.com/office/infopath/2007/PartnerControls">
   <documentManagement/>
@@ -29084,6 +29760,14 @@
 </file>
 
 <file path=customXml/itemProps1.xml><?xml version="1.0" encoding="utf-8"?>
+<ds:datastoreItem xmlns:ds="http://schemas.openxmlformats.org/officeDocument/2006/customXml" ds:itemID="{42BC90D6-94CF-42F7-AAC4-9CF6824C54D5}">
+  <ds:schemaRefs>
+    <ds:schemaRef ds:uri="http://schemas.microsoft.com/sharepoint/v3/contenttype/forms"/>
+  </ds:schemaRefs>
+</ds:datastoreItem>
+</file>
+
+<file path=customXml/itemProps2.xml><?xml version="1.0" encoding="utf-8"?>
 <ds:datastoreItem xmlns:ds="http://schemas.openxmlformats.org/officeDocument/2006/customXml" ds:itemID="{1A503E23-9696-4358-8F00-F7F66AC755EB}">
   <ds:schemaRefs>
     <ds:schemaRef ds:uri="http://schemas.microsoft.com/office/2006/metadata/contentType"/>
@@ -29097,14 +29781,6 @@
     <ds:schemaRef ds:uri="http://purl.org/dc/elements/1.1/"/>
     <ds:schemaRef ds:uri="http://purl.org/dc/terms/"/>
     <ds:schemaRef ds:uri="http://schemas.microsoft.com/internal/obd"/>
-  </ds:schemaRefs>
-</ds:datastoreItem>
-</file>
-
-<file path=customXml/itemProps2.xml><?xml version="1.0" encoding="utf-8"?>
-<ds:datastoreItem xmlns:ds="http://schemas.openxmlformats.org/officeDocument/2006/customXml" ds:itemID="{42BC90D6-94CF-42F7-AAC4-9CF6824C54D5}">
-  <ds:schemaRefs>
-    <ds:schemaRef ds:uri="http://schemas.microsoft.com/sharepoint/v3/contenttype/forms"/>
   </ds:schemaRefs>
 </ds:datastoreItem>
 </file>

</xml_diff>